<commit_message>
final presentation in deliverables
</commit_message>
<xml_diff>
--- a/deliverables/Progetto TIW 2023.pptx
+++ b/deliverables/Progetto TIW 2023.pptx
@@ -5,10 +5,10 @@
     <p:sldMasterId id="2147483648" r:id="rId4"/>
   </p:sldMasterIdLst>
   <p:notesMasterIdLst>
-    <p:notesMasterId r:id="rId46"/>
+    <p:notesMasterId r:id="rId45"/>
   </p:notesMasterIdLst>
   <p:handoutMasterIdLst>
-    <p:handoutMasterId r:id="rId47"/>
+    <p:handoutMasterId r:id="rId46"/>
   </p:handoutMasterIdLst>
   <p:sldIdLst>
     <p:sldId id="256" r:id="rId5"/>
@@ -37,21 +37,20 @@
     <p:sldId id="280" r:id="rId28"/>
     <p:sldId id="291" r:id="rId29"/>
     <p:sldId id="261" r:id="rId30"/>
-    <p:sldId id="292" r:id="rId31"/>
-    <p:sldId id="305" r:id="rId32"/>
-    <p:sldId id="293" r:id="rId33"/>
-    <p:sldId id="294" r:id="rId34"/>
-    <p:sldId id="295" r:id="rId35"/>
-    <p:sldId id="296" r:id="rId36"/>
-    <p:sldId id="297" r:id="rId37"/>
-    <p:sldId id="298" r:id="rId38"/>
-    <p:sldId id="299" r:id="rId39"/>
-    <p:sldId id="300" r:id="rId40"/>
-    <p:sldId id="301" r:id="rId41"/>
-    <p:sldId id="302" r:id="rId42"/>
-    <p:sldId id="303" r:id="rId43"/>
-    <p:sldId id="306" r:id="rId44"/>
-    <p:sldId id="304" r:id="rId45"/>
+    <p:sldId id="305" r:id="rId31"/>
+    <p:sldId id="293" r:id="rId32"/>
+    <p:sldId id="294" r:id="rId33"/>
+    <p:sldId id="295" r:id="rId34"/>
+    <p:sldId id="296" r:id="rId35"/>
+    <p:sldId id="297" r:id="rId36"/>
+    <p:sldId id="298" r:id="rId37"/>
+    <p:sldId id="299" r:id="rId38"/>
+    <p:sldId id="300" r:id="rId39"/>
+    <p:sldId id="301" r:id="rId40"/>
+    <p:sldId id="302" r:id="rId41"/>
+    <p:sldId id="303" r:id="rId42"/>
+    <p:sldId id="306" r:id="rId43"/>
+    <p:sldId id="304" r:id="rId44"/>
   </p:sldIdLst>
   <p:sldSz cx="12192000" cy="6858000"/>
   <p:notesSz cx="6858000" cy="9144000"/>
@@ -2406,7 +2405,7 @@
     </p:spTree>
     <p:extLst>
       <p:ext uri="{BB962C8B-B14F-4D97-AF65-F5344CB8AC3E}">
-        <p14:creationId xmlns:p14="http://schemas.microsoft.com/office/powerpoint/2010/main" val="3756838659"/>
+        <p14:creationId xmlns:p14="http://schemas.microsoft.com/office/powerpoint/2010/main" val="2759781168"/>
       </p:ext>
     </p:extLst>
   </p:cSld>
@@ -2491,7 +2490,7 @@
     </p:spTree>
     <p:extLst>
       <p:ext uri="{BB962C8B-B14F-4D97-AF65-F5344CB8AC3E}">
-        <p14:creationId xmlns:p14="http://schemas.microsoft.com/office/powerpoint/2010/main" val="2759781168"/>
+        <p14:creationId xmlns:p14="http://schemas.microsoft.com/office/powerpoint/2010/main" val="2444237575"/>
       </p:ext>
     </p:extLst>
   </p:cSld>
@@ -2576,7 +2575,7 @@
     </p:spTree>
     <p:extLst>
       <p:ext uri="{BB962C8B-B14F-4D97-AF65-F5344CB8AC3E}">
-        <p14:creationId xmlns:p14="http://schemas.microsoft.com/office/powerpoint/2010/main" val="2444237575"/>
+        <p14:creationId xmlns:p14="http://schemas.microsoft.com/office/powerpoint/2010/main" val="878894178"/>
       </p:ext>
     </p:extLst>
   </p:cSld>
@@ -2746,7 +2745,7 @@
     </p:spTree>
     <p:extLst>
       <p:ext uri="{BB962C8B-B14F-4D97-AF65-F5344CB8AC3E}">
-        <p14:creationId xmlns:p14="http://schemas.microsoft.com/office/powerpoint/2010/main" val="878894178"/>
+        <p14:creationId xmlns:p14="http://schemas.microsoft.com/office/powerpoint/2010/main" val="3977057546"/>
       </p:ext>
     </p:extLst>
   </p:cSld>
@@ -2831,7 +2830,7 @@
     </p:spTree>
     <p:extLst>
       <p:ext uri="{BB962C8B-B14F-4D97-AF65-F5344CB8AC3E}">
-        <p14:creationId xmlns:p14="http://schemas.microsoft.com/office/powerpoint/2010/main" val="3977057546"/>
+        <p14:creationId xmlns:p14="http://schemas.microsoft.com/office/powerpoint/2010/main" val="767214439"/>
       </p:ext>
     </p:extLst>
   </p:cSld>
@@ -2916,7 +2915,7 @@
     </p:spTree>
     <p:extLst>
       <p:ext uri="{BB962C8B-B14F-4D97-AF65-F5344CB8AC3E}">
-        <p14:creationId xmlns:p14="http://schemas.microsoft.com/office/powerpoint/2010/main" val="767214439"/>
+        <p14:creationId xmlns:p14="http://schemas.microsoft.com/office/powerpoint/2010/main" val="698099150"/>
       </p:ext>
     </p:extLst>
   </p:cSld>
@@ -3001,7 +3000,7 @@
     </p:spTree>
     <p:extLst>
       <p:ext uri="{BB962C8B-B14F-4D97-AF65-F5344CB8AC3E}">
-        <p14:creationId xmlns:p14="http://schemas.microsoft.com/office/powerpoint/2010/main" val="698099150"/>
+        <p14:creationId xmlns:p14="http://schemas.microsoft.com/office/powerpoint/2010/main" val="616402646"/>
       </p:ext>
     </p:extLst>
   </p:cSld>
@@ -3086,7 +3085,7 @@
     </p:spTree>
     <p:extLst>
       <p:ext uri="{BB962C8B-B14F-4D97-AF65-F5344CB8AC3E}">
-        <p14:creationId xmlns:p14="http://schemas.microsoft.com/office/powerpoint/2010/main" val="616402646"/>
+        <p14:creationId xmlns:p14="http://schemas.microsoft.com/office/powerpoint/2010/main" val="16599683"/>
       </p:ext>
     </p:extLst>
   </p:cSld>
@@ -3171,7 +3170,7 @@
     </p:spTree>
     <p:extLst>
       <p:ext uri="{BB962C8B-B14F-4D97-AF65-F5344CB8AC3E}">
-        <p14:creationId xmlns:p14="http://schemas.microsoft.com/office/powerpoint/2010/main" val="16599683"/>
+        <p14:creationId xmlns:p14="http://schemas.microsoft.com/office/powerpoint/2010/main" val="2008022430"/>
       </p:ext>
     </p:extLst>
   </p:cSld>
@@ -3256,7 +3255,7 @@
     </p:spTree>
     <p:extLst>
       <p:ext uri="{BB962C8B-B14F-4D97-AF65-F5344CB8AC3E}">
-        <p14:creationId xmlns:p14="http://schemas.microsoft.com/office/powerpoint/2010/main" val="2008022430"/>
+        <p14:creationId xmlns:p14="http://schemas.microsoft.com/office/powerpoint/2010/main" val="708823872"/>
       </p:ext>
     </p:extLst>
   </p:cSld>
@@ -3341,7 +3340,7 @@
     </p:spTree>
     <p:extLst>
       <p:ext uri="{BB962C8B-B14F-4D97-AF65-F5344CB8AC3E}">
-        <p14:creationId xmlns:p14="http://schemas.microsoft.com/office/powerpoint/2010/main" val="708823872"/>
+        <p14:creationId xmlns:p14="http://schemas.microsoft.com/office/powerpoint/2010/main" val="418257665"/>
       </p:ext>
     </p:extLst>
   </p:cSld>
@@ -3426,7 +3425,7 @@
     </p:spTree>
     <p:extLst>
       <p:ext uri="{BB962C8B-B14F-4D97-AF65-F5344CB8AC3E}">
-        <p14:creationId xmlns:p14="http://schemas.microsoft.com/office/powerpoint/2010/main" val="418257665"/>
+        <p14:creationId xmlns:p14="http://schemas.microsoft.com/office/powerpoint/2010/main" val="1385803301"/>
       </p:ext>
     </p:extLst>
   </p:cSld>
@@ -3511,7 +3510,7 @@
     </p:spTree>
     <p:extLst>
       <p:ext uri="{BB962C8B-B14F-4D97-AF65-F5344CB8AC3E}">
-        <p14:creationId xmlns:p14="http://schemas.microsoft.com/office/powerpoint/2010/main" val="1385803301"/>
+        <p14:creationId xmlns:p14="http://schemas.microsoft.com/office/powerpoint/2010/main" val="3554001712"/>
       </p:ext>
     </p:extLst>
   </p:cSld>
@@ -3673,91 +3672,6 @@
             <a:fld id="{22289C57-55D7-40A4-A101-E74FAC7A092B}" type="slidenum">
               <a:rPr lang="it-IT" smtClean="0"/>
               <a:t>40</a:t>
-            </a:fld>
-            <a:endParaRPr lang="it-IT" dirty="0"/>
-          </a:p>
-        </p:txBody>
-      </p:sp>
-    </p:spTree>
-    <p:extLst>
-      <p:ext uri="{BB962C8B-B14F-4D97-AF65-F5344CB8AC3E}">
-        <p14:creationId xmlns:p14="http://schemas.microsoft.com/office/powerpoint/2010/main" val="3554001712"/>
-      </p:ext>
-    </p:extLst>
-  </p:cSld>
-  <p:clrMapOvr>
-    <a:masterClrMapping/>
-  </p:clrMapOvr>
-</p:notes>
-</file>
-
-<file path=ppt/notesSlides/notesSlide41.xml><?xml version="1.0" encoding="utf-8"?>
-<p:notes xmlns:a="http://schemas.openxmlformats.org/drawingml/2006/main" xmlns:r="http://schemas.openxmlformats.org/officeDocument/2006/relationships" xmlns:p="http://schemas.openxmlformats.org/presentationml/2006/main">
-  <p:cSld>
-    <p:spTree>
-      <p:nvGrpSpPr>
-        <p:cNvPr id="1" name=""/>
-        <p:cNvGrpSpPr/>
-        <p:nvPr/>
-      </p:nvGrpSpPr>
-      <p:grpSpPr>
-        <a:xfrm>
-          <a:off x="0" y="0"/>
-          <a:ext cx="0" cy="0"/>
-          <a:chOff x="0" y="0"/>
-          <a:chExt cx="0" cy="0"/>
-        </a:xfrm>
-      </p:grpSpPr>
-      <p:sp>
-        <p:nvSpPr>
-          <p:cNvPr id="2" name="Segnaposto immagine diapositiva 1"/>
-          <p:cNvSpPr>
-            <a:spLocks noGrp="1" noRot="1" noChangeAspect="1"/>
-          </p:cNvSpPr>
-          <p:nvPr>
-            <p:ph type="sldImg"/>
-          </p:nvPr>
-        </p:nvSpPr>
-        <p:spPr/>
-      </p:sp>
-      <p:sp>
-        <p:nvSpPr>
-          <p:cNvPr id="3" name="Segnaposto note 2"/>
-          <p:cNvSpPr>
-            <a:spLocks noGrp="1"/>
-          </p:cNvSpPr>
-          <p:nvPr>
-            <p:ph type="body" idx="1"/>
-          </p:nvPr>
-        </p:nvSpPr>
-        <p:spPr/>
-        <p:txBody>
-          <a:bodyPr/>
-          <a:lstStyle/>
-          <a:p>
-            <a:endParaRPr lang="it-IT" dirty="0"/>
-          </a:p>
-        </p:txBody>
-      </p:sp>
-      <p:sp>
-        <p:nvSpPr>
-          <p:cNvPr id="4" name="Segnaposto numero diapositiva 3"/>
-          <p:cNvSpPr>
-            <a:spLocks noGrp="1"/>
-          </p:cNvSpPr>
-          <p:nvPr>
-            <p:ph type="sldNum" sz="quarter" idx="5"/>
-          </p:nvPr>
-        </p:nvSpPr>
-        <p:spPr/>
-        <p:txBody>
-          <a:bodyPr/>
-          <a:lstStyle/>
-          <a:p>
-            <a:pPr rtl="0"/>
-            <a:fld id="{22289C57-55D7-40A4-A101-E74FAC7A092B}" type="slidenum">
-              <a:rPr lang="it-IT" smtClean="0"/>
-              <a:t>41</a:t>
             </a:fld>
             <a:endParaRPr lang="it-IT" dirty="0"/>
           </a:p>
@@ -19473,6 +19387,83 @@
               <a:t>(fisso) di spedizione dell’utente. </a:t>
             </a:r>
           </a:p>
+          <a:p>
+            <a:pPr marL="70485" marR="67945" algn="ctr">
+              <a:lnSpc>
+                <a:spcPct val="115000"/>
+              </a:lnSpc>
+              <a:spcBef>
+                <a:spcPts val="240"/>
+              </a:spcBef>
+            </a:pPr>
+            <a:r>
+              <a:rPr lang="it-IT" sz="1800" dirty="0">
+                <a:solidFill>
+                  <a:srgbClr val="FF0000"/>
+                </a:solidFill>
+                <a:latin typeface="Tenorite (Corpo)"/>
+                <a:ea typeface="Calibri" panose="020F0502020204030204" pitchFamily="34" charset="0"/>
+              </a:rPr>
+              <a:t>Entità</a:t>
+            </a:r>
+            <a:r>
+              <a:rPr lang="it-IT" sz="1800" dirty="0">
+                <a:latin typeface="Tenorite (Corpo)"/>
+                <a:ea typeface="Calibri" panose="020F0502020204030204" pitchFamily="34" charset="0"/>
+              </a:rPr>
+              <a:t>, </a:t>
+            </a:r>
+            <a:r>
+              <a:rPr lang="it-IT" sz="1800" dirty="0">
+                <a:solidFill>
+                  <a:srgbClr val="00B050"/>
+                </a:solidFill>
+                <a:latin typeface="Tenorite (Corpo)"/>
+                <a:ea typeface="Calibri" panose="020F0502020204030204" pitchFamily="34" charset="0"/>
+              </a:rPr>
+              <a:t>attributi</a:t>
+            </a:r>
+            <a:r>
+              <a:rPr lang="it-IT" sz="1800" dirty="0">
+                <a:latin typeface="Tenorite (Corpo)"/>
+                <a:ea typeface="Calibri" panose="020F0502020204030204" pitchFamily="34" charset="0"/>
+              </a:rPr>
+              <a:t> e </a:t>
+            </a:r>
+            <a:r>
+              <a:rPr lang="it-IT" sz="1800" dirty="0">
+                <a:solidFill>
+                  <a:srgbClr val="0070C0"/>
+                </a:solidFill>
+                <a:latin typeface="Tenorite (Corpo)"/>
+                <a:ea typeface="Calibri" panose="020F0502020204030204" pitchFamily="34" charset="0"/>
+              </a:rPr>
+              <a:t>relazioni</a:t>
+            </a:r>
+            <a:endParaRPr lang="it-IT" sz="1800" dirty="0">
+              <a:solidFill>
+                <a:srgbClr val="0070C0"/>
+              </a:solidFill>
+              <a:effectLst/>
+              <a:latin typeface="Tenorite (Corpo)"/>
+              <a:ea typeface="Calibri" panose="020F0502020204030204" pitchFamily="34" charset="0"/>
+            </a:endParaRPr>
+          </a:p>
+          <a:p>
+            <a:pPr marL="70485" marR="67945" algn="just">
+              <a:lnSpc>
+                <a:spcPct val="115000"/>
+              </a:lnSpc>
+              <a:spcBef>
+                <a:spcPts val="240"/>
+              </a:spcBef>
+            </a:pPr>
+            <a:endParaRPr lang="it-IT" sz="1800" dirty="0">
+              <a:effectLst/>
+              <a:latin typeface="Tenorite (Corpo)"/>
+              <a:ea typeface="Calibri" panose="020F0502020204030204" pitchFamily="34" charset="0"/>
+            </a:endParaRPr>
+          </a:p>
         </p:txBody>
       </p:sp>
       <p:sp>
@@ -20929,7 +20920,7 @@
         </p:nvSpPr>
         <p:spPr>
           <a:xfrm>
-            <a:off x="547955" y="1232898"/>
+            <a:off x="776555" y="1385297"/>
             <a:ext cx="4862245" cy="5323267"/>
           </a:xfrm>
           <a:prstGeom prst="rect">
@@ -20938,7 +20929,7 @@
         </p:spPr>
         <p:txBody>
           <a:bodyPr rtlCol="0">
-            <a:normAutofit fontScale="77500" lnSpcReduction="20000"/>
+            <a:normAutofit fontScale="85000" lnSpcReduction="10000"/>
           </a:bodyPr>
           <a:lstStyle>
             <a:defPPr>
@@ -21107,133 +21098,6 @@
               </a:defRPr>
             </a:lvl9pPr>
           </a:lstStyle>
-          <a:p>
-            <a:pPr marL="0" marR="73660" indent="0" algn="just">
-              <a:lnSpc>
-                <a:spcPct val="115000"/>
-              </a:lnSpc>
-              <a:spcBef>
-                <a:spcPts val="225"/>
-              </a:spcBef>
-              <a:buNone/>
-            </a:pPr>
-            <a:r>
-              <a:rPr lang="en-US" sz="1800" b="1" dirty="0">
-                <a:latin typeface="Tenorite (Corpo)"/>
-                <a:ea typeface="Cambria" panose="02040503050406030204" pitchFamily="18" charset="0"/>
-                <a:cs typeface="Cambria" panose="02040503050406030204" pitchFamily="18" charset="0"/>
-              </a:rPr>
-              <a:t>Model objects:</a:t>
-            </a:r>
-          </a:p>
-          <a:p>
-            <a:pPr marR="73660" algn="just">
-              <a:lnSpc>
-                <a:spcPct val="115000"/>
-              </a:lnSpc>
-              <a:spcBef>
-                <a:spcPts val="225"/>
-              </a:spcBef>
-            </a:pPr>
-            <a:r>
-              <a:rPr lang="en-US" sz="1800" dirty="0" err="1">
-                <a:latin typeface="Tenorite (Corpo)"/>
-                <a:ea typeface="Cambria" panose="02040503050406030204" pitchFamily="18" charset="0"/>
-                <a:cs typeface="Cambria" panose="02040503050406030204" pitchFamily="18" charset="0"/>
-              </a:rPr>
-              <a:t>AuctionBean</a:t>
-            </a:r>
-            <a:endParaRPr lang="en-US" sz="1800" dirty="0">
-              <a:latin typeface="Tenorite (Corpo)"/>
-              <a:ea typeface="Cambria" panose="02040503050406030204" pitchFamily="18" charset="0"/>
-              <a:cs typeface="Cambria" panose="02040503050406030204" pitchFamily="18" charset="0"/>
-            </a:endParaRPr>
-          </a:p>
-          <a:p>
-            <a:pPr marR="73660" algn="just">
-              <a:lnSpc>
-                <a:spcPct val="115000"/>
-              </a:lnSpc>
-              <a:spcBef>
-                <a:spcPts val="225"/>
-              </a:spcBef>
-            </a:pPr>
-            <a:r>
-              <a:rPr lang="en-US" sz="1800" dirty="0" err="1">
-                <a:latin typeface="Tenorite (Corpo)"/>
-                <a:ea typeface="Cambria" panose="02040503050406030204" pitchFamily="18" charset="0"/>
-                <a:cs typeface="Cambria" panose="02040503050406030204" pitchFamily="18" charset="0"/>
-              </a:rPr>
-              <a:t>OfferBean</a:t>
-            </a:r>
-            <a:endParaRPr lang="en-US" sz="1800" dirty="0">
-              <a:latin typeface="Tenorite (Corpo)"/>
-              <a:ea typeface="Cambria" panose="02040503050406030204" pitchFamily="18" charset="0"/>
-              <a:cs typeface="Cambria" panose="02040503050406030204" pitchFamily="18" charset="0"/>
-            </a:endParaRPr>
-          </a:p>
-          <a:p>
-            <a:pPr marR="73660" algn="just">
-              <a:lnSpc>
-                <a:spcPct val="115000"/>
-              </a:lnSpc>
-              <a:spcBef>
-                <a:spcPts val="225"/>
-              </a:spcBef>
-            </a:pPr>
-            <a:r>
-              <a:rPr lang="en-US" sz="1800" dirty="0" err="1">
-                <a:latin typeface="Tenorite (Corpo)"/>
-                <a:ea typeface="Cambria" panose="02040503050406030204" pitchFamily="18" charset="0"/>
-                <a:cs typeface="Cambria" panose="02040503050406030204" pitchFamily="18" charset="0"/>
-              </a:rPr>
-              <a:t>ProductBean</a:t>
-            </a:r>
-            <a:endParaRPr lang="en-US" sz="1800" dirty="0">
-              <a:latin typeface="Tenorite (Corpo)"/>
-              <a:ea typeface="Cambria" panose="02040503050406030204" pitchFamily="18" charset="0"/>
-              <a:cs typeface="Cambria" panose="02040503050406030204" pitchFamily="18" charset="0"/>
-            </a:endParaRPr>
-          </a:p>
-          <a:p>
-            <a:pPr marR="73660" algn="just">
-              <a:lnSpc>
-                <a:spcPct val="115000"/>
-              </a:lnSpc>
-              <a:spcBef>
-                <a:spcPts val="225"/>
-              </a:spcBef>
-            </a:pPr>
-            <a:r>
-              <a:rPr lang="en-US" sz="1800" dirty="0" err="1">
-                <a:latin typeface="Tenorite (Corpo)"/>
-                <a:ea typeface="Cambria" panose="02040503050406030204" pitchFamily="18" charset="0"/>
-                <a:cs typeface="Cambria" panose="02040503050406030204" pitchFamily="18" charset="0"/>
-              </a:rPr>
-              <a:t>UserBean</a:t>
-            </a:r>
-            <a:endParaRPr lang="en-US" sz="1800" dirty="0">
-              <a:latin typeface="Tenorite (Corpo)"/>
-              <a:ea typeface="Cambria" panose="02040503050406030204" pitchFamily="18" charset="0"/>
-              <a:cs typeface="Cambria" panose="02040503050406030204" pitchFamily="18" charset="0"/>
-            </a:endParaRPr>
-          </a:p>
-          <a:p>
-            <a:pPr marL="0" marR="73660" indent="0" algn="just">
-              <a:lnSpc>
-                <a:spcPct val="115000"/>
-              </a:lnSpc>
-              <a:spcBef>
-                <a:spcPts val="225"/>
-              </a:spcBef>
-              <a:buNone/>
-            </a:pPr>
-            <a:endParaRPr lang="it-IT" sz="1800" dirty="0">
-              <a:latin typeface="Tenorite (Corpo)"/>
-              <a:ea typeface="Cambria" panose="02040503050406030204" pitchFamily="18" charset="0"/>
-              <a:cs typeface="Cambria" panose="02040503050406030204" pitchFamily="18" charset="0"/>
-            </a:endParaRPr>
-          </a:p>
           <a:p>
             <a:pPr marL="0" marR="73660" indent="0" algn="just">
               <a:lnSpc>
@@ -23112,7 +22976,7 @@
     </p:spTree>
     <p:extLst>
       <p:ext uri="{BB962C8B-B14F-4D97-AF65-F5344CB8AC3E}">
-        <p14:creationId xmlns:p14="http://schemas.microsoft.com/office/powerpoint/2010/main" val="1159649451"/>
+        <p14:creationId xmlns:p14="http://schemas.microsoft.com/office/powerpoint/2010/main" val="640691602"/>
       </p:ext>
     </p:extLst>
   </p:cSld>
@@ -23253,2079 +23117,40 @@
           </a:p>
         </p:txBody>
       </p:sp>
-      <p:sp>
-        <p:nvSpPr>
-          <p:cNvPr id="2" name="Segnaposto testo 2">
+      <p:pic>
+        <p:nvPicPr>
+          <p:cNvPr id="3" name="Immagine 2" descr="Immagine che contiene testo, linea, diagramma, schermata&#10;&#10;Descrizione generata automaticamente">
             <a:extLst>
               <a:ext uri="{FF2B5EF4-FFF2-40B4-BE49-F238E27FC236}">
-                <a16:creationId xmlns:a16="http://schemas.microsoft.com/office/drawing/2014/main" id="{74AB54BC-3D93-72E5-BF77-0F7162FD319D}"/>
+                <a16:creationId xmlns:a16="http://schemas.microsoft.com/office/drawing/2014/main" id="{620E1218-F6F9-B4A2-4F7A-D596029A14AE}"/>
               </a:ext>
             </a:extLst>
           </p:cNvPr>
-          <p:cNvSpPr txBox="1">
-            <a:spLocks/>
-          </p:cNvSpPr>
+          <p:cNvPicPr>
+            <a:picLocks noChangeAspect="1"/>
+          </p:cNvPicPr>
           <p:nvPr/>
-        </p:nvSpPr>
+        </p:nvPicPr>
+        <p:blipFill>
+          <a:blip r:embed="rId3"/>
+          <a:stretch>
+            <a:fillRect/>
+          </a:stretch>
+        </p:blipFill>
         <p:spPr>
           <a:xfrm>
-            <a:off x="776555" y="1385297"/>
-            <a:ext cx="4862245" cy="5323267"/>
+            <a:off x="1129004" y="1355055"/>
+            <a:ext cx="9933992" cy="4595233"/>
           </a:xfrm>
           <a:prstGeom prst="rect">
             <a:avLst/>
           </a:prstGeom>
         </p:spPr>
-        <p:txBody>
-          <a:bodyPr rtlCol="0">
-            <a:normAutofit fontScale="85000" lnSpcReduction="10000"/>
-          </a:bodyPr>
-          <a:lstStyle>
-            <a:defPPr>
-              <a:defRPr lang="it-IT"/>
-            </a:defPPr>
-            <a:lvl1pPr marL="228600" indent="-228600" algn="l" defTabSz="914400" rtl="0" eaLnBrk="1" latinLnBrk="0" hangingPunct="1">
-              <a:lnSpc>
-                <a:spcPct val="90000"/>
-              </a:lnSpc>
-              <a:spcBef>
-                <a:spcPts val="1000"/>
-              </a:spcBef>
-              <a:buFont typeface="Arial" panose="020B0604020202020204" pitchFamily="34" charset="0"/>
-              <a:buChar char="•"/>
-              <a:defRPr lang="it-IT" sz="2800" kern="1200">
-                <a:solidFill>
-                  <a:schemeClr val="tx1"/>
-                </a:solidFill>
-                <a:latin typeface="+mn-lt"/>
-                <a:ea typeface="+mn-ea"/>
-                <a:cs typeface="+mn-cs"/>
-              </a:defRPr>
-            </a:lvl1pPr>
-            <a:lvl2pPr marL="685800" indent="-228600" algn="l" defTabSz="914400" rtl="0" eaLnBrk="1" latinLnBrk="0" hangingPunct="1">
-              <a:lnSpc>
-                <a:spcPct val="90000"/>
-              </a:lnSpc>
-              <a:spcBef>
-                <a:spcPts val="500"/>
-              </a:spcBef>
-              <a:buFont typeface="Arial" panose="020B0604020202020204" pitchFamily="34" charset="0"/>
-              <a:buChar char="•"/>
-              <a:defRPr lang="it-IT" sz="2400" kern="1200">
-                <a:solidFill>
-                  <a:schemeClr val="tx1"/>
-                </a:solidFill>
-                <a:latin typeface="+mn-lt"/>
-                <a:ea typeface="+mn-ea"/>
-                <a:cs typeface="+mn-cs"/>
-              </a:defRPr>
-            </a:lvl2pPr>
-            <a:lvl3pPr marL="1143000" indent="-228600" algn="l" defTabSz="914400" rtl="0" eaLnBrk="1" latinLnBrk="0" hangingPunct="1">
-              <a:lnSpc>
-                <a:spcPct val="90000"/>
-              </a:lnSpc>
-              <a:spcBef>
-                <a:spcPts val="500"/>
-              </a:spcBef>
-              <a:buFont typeface="Arial" panose="020B0604020202020204" pitchFamily="34" charset="0"/>
-              <a:buChar char="•"/>
-              <a:defRPr lang="it-IT" sz="2000" kern="1200">
-                <a:solidFill>
-                  <a:schemeClr val="tx1"/>
-                </a:solidFill>
-                <a:latin typeface="+mn-lt"/>
-                <a:ea typeface="+mn-ea"/>
-                <a:cs typeface="+mn-cs"/>
-              </a:defRPr>
-            </a:lvl3pPr>
-            <a:lvl4pPr marL="1600200" indent="-228600" algn="l" defTabSz="914400" rtl="0" eaLnBrk="1" latinLnBrk="0" hangingPunct="1">
-              <a:lnSpc>
-                <a:spcPct val="90000"/>
-              </a:lnSpc>
-              <a:spcBef>
-                <a:spcPts val="500"/>
-              </a:spcBef>
-              <a:buFont typeface="Arial" panose="020B0604020202020204" pitchFamily="34" charset="0"/>
-              <a:buChar char="•"/>
-              <a:defRPr lang="it-IT" sz="1800" kern="1200">
-                <a:solidFill>
-                  <a:schemeClr val="tx1"/>
-                </a:solidFill>
-                <a:latin typeface="+mn-lt"/>
-                <a:ea typeface="+mn-ea"/>
-                <a:cs typeface="+mn-cs"/>
-              </a:defRPr>
-            </a:lvl4pPr>
-            <a:lvl5pPr marL="2057400" indent="-228600" algn="l" defTabSz="914400" rtl="0" eaLnBrk="1" latinLnBrk="0" hangingPunct="1">
-              <a:lnSpc>
-                <a:spcPct val="90000"/>
-              </a:lnSpc>
-              <a:spcBef>
-                <a:spcPts val="500"/>
-              </a:spcBef>
-              <a:buFont typeface="Arial" panose="020B0604020202020204" pitchFamily="34" charset="0"/>
-              <a:buChar char="•"/>
-              <a:defRPr lang="it-IT" sz="1800" kern="1200">
-                <a:solidFill>
-                  <a:schemeClr val="tx1"/>
-                </a:solidFill>
-                <a:latin typeface="+mn-lt"/>
-                <a:ea typeface="+mn-ea"/>
-                <a:cs typeface="+mn-cs"/>
-              </a:defRPr>
-            </a:lvl5pPr>
-            <a:lvl6pPr marL="2514600" indent="-228600" algn="l" defTabSz="914400" rtl="0" eaLnBrk="1" latinLnBrk="0" hangingPunct="1">
-              <a:lnSpc>
-                <a:spcPct val="90000"/>
-              </a:lnSpc>
-              <a:spcBef>
-                <a:spcPts val="500"/>
-              </a:spcBef>
-              <a:buFont typeface="Arial" panose="020B0604020202020204" pitchFamily="34" charset="0"/>
-              <a:buChar char="•"/>
-              <a:defRPr lang="it-IT" sz="1800" kern="1200">
-                <a:solidFill>
-                  <a:schemeClr val="tx1"/>
-                </a:solidFill>
-                <a:latin typeface="+mn-lt"/>
-                <a:ea typeface="+mn-ea"/>
-                <a:cs typeface="+mn-cs"/>
-              </a:defRPr>
-            </a:lvl6pPr>
-            <a:lvl7pPr marL="2971800" indent="-228600" algn="l" defTabSz="914400" rtl="0" eaLnBrk="1" latinLnBrk="0" hangingPunct="1">
-              <a:lnSpc>
-                <a:spcPct val="90000"/>
-              </a:lnSpc>
-              <a:spcBef>
-                <a:spcPts val="500"/>
-              </a:spcBef>
-              <a:buFont typeface="Arial" panose="020B0604020202020204" pitchFamily="34" charset="0"/>
-              <a:buChar char="•"/>
-              <a:defRPr lang="it-IT" sz="1800" kern="1200">
-                <a:solidFill>
-                  <a:schemeClr val="tx1"/>
-                </a:solidFill>
-                <a:latin typeface="+mn-lt"/>
-                <a:ea typeface="+mn-ea"/>
-                <a:cs typeface="+mn-cs"/>
-              </a:defRPr>
-            </a:lvl7pPr>
-            <a:lvl8pPr marL="3429000" indent="-228600" algn="l" defTabSz="914400" rtl="0" eaLnBrk="1" latinLnBrk="0" hangingPunct="1">
-              <a:lnSpc>
-                <a:spcPct val="90000"/>
-              </a:lnSpc>
-              <a:spcBef>
-                <a:spcPts val="500"/>
-              </a:spcBef>
-              <a:buFont typeface="Arial" panose="020B0604020202020204" pitchFamily="34" charset="0"/>
-              <a:buChar char="•"/>
-              <a:defRPr lang="it-IT" sz="1800" kern="1200">
-                <a:solidFill>
-                  <a:schemeClr val="tx1"/>
-                </a:solidFill>
-                <a:latin typeface="+mn-lt"/>
-                <a:ea typeface="+mn-ea"/>
-                <a:cs typeface="+mn-cs"/>
-              </a:defRPr>
-            </a:lvl8pPr>
-            <a:lvl9pPr marL="3886200" indent="-228600" algn="l" defTabSz="914400" rtl="0" eaLnBrk="1" latinLnBrk="0" hangingPunct="1">
-              <a:lnSpc>
-                <a:spcPct val="90000"/>
-              </a:lnSpc>
-              <a:spcBef>
-                <a:spcPts val="500"/>
-              </a:spcBef>
-              <a:buFont typeface="Arial" panose="020B0604020202020204" pitchFamily="34" charset="0"/>
-              <a:buChar char="•"/>
-              <a:defRPr lang="it-IT" sz="1800" kern="1200">
-                <a:solidFill>
-                  <a:schemeClr val="tx1"/>
-                </a:solidFill>
-                <a:latin typeface="+mn-lt"/>
-                <a:ea typeface="+mn-ea"/>
-                <a:cs typeface="+mn-cs"/>
-              </a:defRPr>
-            </a:lvl9pPr>
-          </a:lstStyle>
-          <a:p>
-            <a:pPr marL="0" marR="73660" indent="0" algn="just">
-              <a:lnSpc>
-                <a:spcPct val="115000"/>
-              </a:lnSpc>
-              <a:spcBef>
-                <a:spcPts val="225"/>
-              </a:spcBef>
-              <a:buNone/>
-            </a:pPr>
-            <a:r>
-              <a:rPr lang="it-IT" sz="1800" b="1" dirty="0">
-                <a:latin typeface="Tenorite (Corpo)"/>
-                <a:ea typeface="Cambria" panose="02040503050406030204" pitchFamily="18" charset="0"/>
-                <a:cs typeface="Cambria" panose="02040503050406030204" pitchFamily="18" charset="0"/>
-              </a:rPr>
-              <a:t>Data Access </a:t>
-            </a:r>
-            <a:r>
-              <a:rPr lang="it-IT" sz="1800" b="1" dirty="0" err="1">
-                <a:latin typeface="Tenorite (Corpo)"/>
-                <a:ea typeface="Cambria" panose="02040503050406030204" pitchFamily="18" charset="0"/>
-                <a:cs typeface="Cambria" panose="02040503050406030204" pitchFamily="18" charset="0"/>
-              </a:rPr>
-              <a:t>objects</a:t>
-            </a:r>
-            <a:r>
-              <a:rPr lang="it-IT" sz="1800" b="1" dirty="0">
-                <a:latin typeface="Tenorite (Corpo)"/>
-                <a:ea typeface="Cambria" panose="02040503050406030204" pitchFamily="18" charset="0"/>
-                <a:cs typeface="Cambria" panose="02040503050406030204" pitchFamily="18" charset="0"/>
-              </a:rPr>
-              <a:t>:</a:t>
-            </a:r>
-          </a:p>
-          <a:p>
-            <a:pPr marR="73660" algn="just">
-              <a:lnSpc>
-                <a:spcPct val="115000"/>
-              </a:lnSpc>
-              <a:spcBef>
-                <a:spcPts val="225"/>
-              </a:spcBef>
-            </a:pPr>
-            <a:r>
-              <a:rPr lang="it-IT" sz="1800" dirty="0" err="1">
-                <a:latin typeface="Tenorite (Corpo)"/>
-                <a:ea typeface="Cambria" panose="02040503050406030204" pitchFamily="18" charset="0"/>
-                <a:cs typeface="Cambria" panose="02040503050406030204" pitchFamily="18" charset="0"/>
-              </a:rPr>
-              <a:t>AuctionDAO</a:t>
-            </a:r>
-            <a:r>
-              <a:rPr lang="it-IT" sz="1800" dirty="0">
-                <a:latin typeface="Tenorite (Corpo)"/>
-                <a:ea typeface="Cambria" panose="02040503050406030204" pitchFamily="18" charset="0"/>
-                <a:cs typeface="Cambria" panose="02040503050406030204" pitchFamily="18" charset="0"/>
-              </a:rPr>
-              <a:t>: </a:t>
-            </a:r>
-            <a:r>
-              <a:rPr lang="it-IT" sz="1800" dirty="0" err="1">
-                <a:latin typeface="Tenorite (Corpo)"/>
-                <a:ea typeface="Cambria" panose="02040503050406030204" pitchFamily="18" charset="0"/>
-                <a:cs typeface="Cambria" panose="02040503050406030204" pitchFamily="18" charset="0"/>
-              </a:rPr>
-              <a:t>createAuction</a:t>
-            </a:r>
-            <a:r>
-              <a:rPr lang="it-IT" sz="1800" dirty="0">
-                <a:latin typeface="Tenorite (Corpo)"/>
-                <a:ea typeface="Cambria" panose="02040503050406030204" pitchFamily="18" charset="0"/>
-                <a:cs typeface="Cambria" panose="02040503050406030204" pitchFamily="18" charset="0"/>
-              </a:rPr>
-              <a:t> (</a:t>
-            </a:r>
-            <a:r>
-              <a:rPr lang="it-IT" sz="1800" dirty="0" err="1">
-                <a:latin typeface="Tenorite (Corpo)"/>
-                <a:ea typeface="Cambria" panose="02040503050406030204" pitchFamily="18" charset="0"/>
-                <a:cs typeface="Cambria" panose="02040503050406030204" pitchFamily="18" charset="0"/>
-              </a:rPr>
-              <a:t>price,rise</a:t>
-            </a:r>
-            <a:r>
-              <a:rPr lang="it-IT" sz="1800" dirty="0">
-                <a:latin typeface="Tenorite (Corpo)"/>
-                <a:ea typeface="Cambria" panose="02040503050406030204" pitchFamily="18" charset="0"/>
-                <a:cs typeface="Cambria" panose="02040503050406030204" pitchFamily="18" charset="0"/>
-              </a:rPr>
-              <a:t>, </a:t>
-            </a:r>
-            <a:r>
-              <a:rPr lang="it-IT" sz="1800" dirty="0" err="1">
-                <a:latin typeface="Tenorite (Corpo)"/>
-                <a:ea typeface="Cambria" panose="02040503050406030204" pitchFamily="18" charset="0"/>
-                <a:cs typeface="Cambria" panose="02040503050406030204" pitchFamily="18" charset="0"/>
-              </a:rPr>
-              <a:t>expiry</a:t>
-            </a:r>
-            <a:r>
-              <a:rPr lang="it-IT" sz="1800" dirty="0">
-                <a:latin typeface="Tenorite (Corpo)"/>
-                <a:ea typeface="Cambria" panose="02040503050406030204" pitchFamily="18" charset="0"/>
-                <a:cs typeface="Cambria" panose="02040503050406030204" pitchFamily="18" charset="0"/>
-              </a:rPr>
-              <a:t>, </a:t>
-            </a:r>
-            <a:r>
-              <a:rPr lang="it-IT" sz="1800" dirty="0" err="1">
-                <a:latin typeface="Tenorite (Corpo)"/>
-                <a:ea typeface="Cambria" panose="02040503050406030204" pitchFamily="18" charset="0"/>
-                <a:cs typeface="Cambria" panose="02040503050406030204" pitchFamily="18" charset="0"/>
-              </a:rPr>
-              <a:t>userID</a:t>
-            </a:r>
-            <a:r>
-              <a:rPr lang="it-IT" sz="1800" dirty="0">
-                <a:latin typeface="Tenorite (Corpo)"/>
-                <a:ea typeface="Cambria" panose="02040503050406030204" pitchFamily="18" charset="0"/>
-                <a:cs typeface="Cambria" panose="02040503050406030204" pitchFamily="18" charset="0"/>
-              </a:rPr>
-              <a:t>), </a:t>
-            </a:r>
-            <a:r>
-              <a:rPr lang="it-IT" sz="1800" dirty="0" err="1">
-                <a:latin typeface="Tenorite (Corpo)"/>
-                <a:ea typeface="Cambria" panose="02040503050406030204" pitchFamily="18" charset="0"/>
-                <a:cs typeface="Cambria" panose="02040503050406030204" pitchFamily="18" charset="0"/>
-              </a:rPr>
-              <a:t>getUserAuctions</a:t>
-            </a:r>
-            <a:r>
-              <a:rPr lang="it-IT" sz="1800" dirty="0">
-                <a:latin typeface="Tenorite (Corpo)"/>
-                <a:ea typeface="Cambria" panose="02040503050406030204" pitchFamily="18" charset="0"/>
-                <a:cs typeface="Cambria" panose="02040503050406030204" pitchFamily="18" charset="0"/>
-              </a:rPr>
-              <a:t> (</a:t>
-            </a:r>
-            <a:r>
-              <a:rPr lang="it-IT" sz="1800" dirty="0" err="1">
-                <a:latin typeface="Tenorite (Corpo)"/>
-                <a:ea typeface="Cambria" panose="02040503050406030204" pitchFamily="18" charset="0"/>
-                <a:cs typeface="Cambria" panose="02040503050406030204" pitchFamily="18" charset="0"/>
-              </a:rPr>
-              <a:t>userID</a:t>
-            </a:r>
-            <a:r>
-              <a:rPr lang="it-IT" sz="1800" dirty="0">
-                <a:latin typeface="Tenorite (Corpo)"/>
-                <a:ea typeface="Cambria" panose="02040503050406030204" pitchFamily="18" charset="0"/>
-                <a:cs typeface="Cambria" panose="02040503050406030204" pitchFamily="18" charset="0"/>
-              </a:rPr>
-              <a:t>, active, </a:t>
-            </a:r>
-            <a:r>
-              <a:rPr lang="it-IT" sz="1800" dirty="0" err="1">
-                <a:latin typeface="Tenorite (Corpo)"/>
-                <a:ea typeface="Cambria" panose="02040503050406030204" pitchFamily="18" charset="0"/>
-                <a:cs typeface="Cambria" panose="02040503050406030204" pitchFamily="18" charset="0"/>
-              </a:rPr>
-              <a:t>loginTime</a:t>
-            </a:r>
-            <a:r>
-              <a:rPr lang="it-IT" sz="1800" dirty="0">
-                <a:latin typeface="Tenorite (Corpo)"/>
-                <a:ea typeface="Cambria" panose="02040503050406030204" pitchFamily="18" charset="0"/>
-                <a:cs typeface="Cambria" panose="02040503050406030204" pitchFamily="18" charset="0"/>
-              </a:rPr>
-              <a:t>), </a:t>
-            </a:r>
-            <a:r>
-              <a:rPr lang="it-IT" sz="1800" dirty="0" err="1">
-                <a:latin typeface="Tenorite (Corpo)"/>
-                <a:ea typeface="Cambria" panose="02040503050406030204" pitchFamily="18" charset="0"/>
-                <a:cs typeface="Cambria" panose="02040503050406030204" pitchFamily="18" charset="0"/>
-              </a:rPr>
-              <a:t>getWinner</a:t>
-            </a:r>
-            <a:r>
-              <a:rPr lang="it-IT" sz="1800" dirty="0">
-                <a:latin typeface="Tenorite (Corpo)"/>
-                <a:ea typeface="Cambria" panose="02040503050406030204" pitchFamily="18" charset="0"/>
-                <a:cs typeface="Cambria" panose="02040503050406030204" pitchFamily="18" charset="0"/>
-              </a:rPr>
-              <a:t> (</a:t>
-            </a:r>
-            <a:r>
-              <a:rPr lang="it-IT" sz="1800" dirty="0" err="1">
-                <a:latin typeface="Tenorite (Corpo)"/>
-                <a:ea typeface="Cambria" panose="02040503050406030204" pitchFamily="18" charset="0"/>
-                <a:cs typeface="Cambria" panose="02040503050406030204" pitchFamily="18" charset="0"/>
-              </a:rPr>
-              <a:t>auctionID</a:t>
-            </a:r>
-            <a:r>
-              <a:rPr lang="it-IT" sz="1800" dirty="0">
-                <a:latin typeface="Tenorite (Corpo)"/>
-                <a:ea typeface="Cambria" panose="02040503050406030204" pitchFamily="18" charset="0"/>
-                <a:cs typeface="Cambria" panose="02040503050406030204" pitchFamily="18" charset="0"/>
-              </a:rPr>
-              <a:t>), </a:t>
-            </a:r>
-            <a:r>
-              <a:rPr lang="it-IT" sz="1800" dirty="0" err="1">
-                <a:latin typeface="Tenorite (Corpo)"/>
-                <a:ea typeface="Cambria" panose="02040503050406030204" pitchFamily="18" charset="0"/>
-                <a:cs typeface="Cambria" panose="02040503050406030204" pitchFamily="18" charset="0"/>
-              </a:rPr>
-              <a:t>isAuctionOwner</a:t>
-            </a:r>
-            <a:r>
-              <a:rPr lang="it-IT" sz="1800" dirty="0">
-                <a:latin typeface="Tenorite (Corpo)"/>
-                <a:ea typeface="Cambria" panose="02040503050406030204" pitchFamily="18" charset="0"/>
-                <a:cs typeface="Cambria" panose="02040503050406030204" pitchFamily="18" charset="0"/>
-              </a:rPr>
-              <a:t> (</a:t>
-            </a:r>
-            <a:r>
-              <a:rPr lang="it-IT" sz="1800" dirty="0" err="1">
-                <a:latin typeface="Tenorite (Corpo)"/>
-                <a:ea typeface="Cambria" panose="02040503050406030204" pitchFamily="18" charset="0"/>
-                <a:cs typeface="Cambria" panose="02040503050406030204" pitchFamily="18" charset="0"/>
-              </a:rPr>
-              <a:t>userID</a:t>
-            </a:r>
-            <a:r>
-              <a:rPr lang="it-IT" sz="1800" dirty="0">
-                <a:latin typeface="Tenorite (Corpo)"/>
-                <a:ea typeface="Cambria" panose="02040503050406030204" pitchFamily="18" charset="0"/>
-                <a:cs typeface="Cambria" panose="02040503050406030204" pitchFamily="18" charset="0"/>
-              </a:rPr>
-              <a:t>, </a:t>
-            </a:r>
-            <a:r>
-              <a:rPr lang="it-IT" sz="1800" dirty="0" err="1">
-                <a:latin typeface="Tenorite (Corpo)"/>
-                <a:ea typeface="Cambria" panose="02040503050406030204" pitchFamily="18" charset="0"/>
-                <a:cs typeface="Cambria" panose="02040503050406030204" pitchFamily="18" charset="0"/>
-              </a:rPr>
-              <a:t>auctionID</a:t>
-            </a:r>
-            <a:r>
-              <a:rPr lang="it-IT" sz="1800" dirty="0">
-                <a:latin typeface="Tenorite (Corpo)"/>
-                <a:ea typeface="Cambria" panose="02040503050406030204" pitchFamily="18" charset="0"/>
-                <a:cs typeface="Cambria" panose="02040503050406030204" pitchFamily="18" charset="0"/>
-              </a:rPr>
-              <a:t>), </a:t>
-            </a:r>
-            <a:r>
-              <a:rPr lang="it-IT" sz="1800" dirty="0" err="1">
-                <a:latin typeface="Tenorite (Corpo)"/>
-                <a:ea typeface="Cambria" panose="02040503050406030204" pitchFamily="18" charset="0"/>
-                <a:cs typeface="Cambria" panose="02040503050406030204" pitchFamily="18" charset="0"/>
-              </a:rPr>
-              <a:t>isAuctionActive</a:t>
-            </a:r>
-            <a:r>
-              <a:rPr lang="it-IT" sz="1800" dirty="0">
-                <a:latin typeface="Tenorite (Corpo)"/>
-                <a:ea typeface="Cambria" panose="02040503050406030204" pitchFamily="18" charset="0"/>
-                <a:cs typeface="Cambria" panose="02040503050406030204" pitchFamily="18" charset="0"/>
-              </a:rPr>
-              <a:t>( </a:t>
-            </a:r>
-            <a:r>
-              <a:rPr lang="it-IT" sz="1800" dirty="0" err="1">
-                <a:latin typeface="Tenorite (Corpo)"/>
-                <a:ea typeface="Cambria" panose="02040503050406030204" pitchFamily="18" charset="0"/>
-                <a:cs typeface="Cambria" panose="02040503050406030204" pitchFamily="18" charset="0"/>
-              </a:rPr>
-              <a:t>auctionID</a:t>
-            </a:r>
-            <a:r>
-              <a:rPr lang="it-IT" sz="1800" dirty="0">
-                <a:latin typeface="Tenorite (Corpo)"/>
-                <a:ea typeface="Cambria" panose="02040503050406030204" pitchFamily="18" charset="0"/>
-                <a:cs typeface="Cambria" panose="02040503050406030204" pitchFamily="18" charset="0"/>
-              </a:rPr>
-              <a:t>), </a:t>
-            </a:r>
-            <a:r>
-              <a:rPr lang="it-IT" sz="1800" dirty="0" err="1">
-                <a:latin typeface="Tenorite (Corpo)"/>
-                <a:ea typeface="Cambria" panose="02040503050406030204" pitchFamily="18" charset="0"/>
-                <a:cs typeface="Cambria" panose="02040503050406030204" pitchFamily="18" charset="0"/>
-              </a:rPr>
-              <a:t>getWonAuctions</a:t>
-            </a:r>
-            <a:r>
-              <a:rPr lang="it-IT" sz="1800" dirty="0">
-                <a:latin typeface="Tenorite (Corpo)"/>
-                <a:ea typeface="Cambria" panose="02040503050406030204" pitchFamily="18" charset="0"/>
-                <a:cs typeface="Cambria" panose="02040503050406030204" pitchFamily="18" charset="0"/>
-              </a:rPr>
-              <a:t> (</a:t>
-            </a:r>
-            <a:r>
-              <a:rPr lang="it-IT" sz="1800" dirty="0" err="1">
-                <a:latin typeface="Tenorite (Corpo)"/>
-                <a:ea typeface="Cambria" panose="02040503050406030204" pitchFamily="18" charset="0"/>
-                <a:cs typeface="Cambria" panose="02040503050406030204" pitchFamily="18" charset="0"/>
-              </a:rPr>
-              <a:t>userID</a:t>
-            </a:r>
-            <a:r>
-              <a:rPr lang="it-IT" sz="1800" dirty="0">
-                <a:latin typeface="Tenorite (Corpo)"/>
-                <a:ea typeface="Cambria" panose="02040503050406030204" pitchFamily="18" charset="0"/>
-                <a:cs typeface="Cambria" panose="02040503050406030204" pitchFamily="18" charset="0"/>
-              </a:rPr>
-              <a:t>), </a:t>
-            </a:r>
-            <a:r>
-              <a:rPr lang="it-IT" sz="1800" dirty="0" err="1">
-                <a:latin typeface="Tenorite (Corpo)"/>
-                <a:ea typeface="Cambria" panose="02040503050406030204" pitchFamily="18" charset="0"/>
-                <a:cs typeface="Cambria" panose="02040503050406030204" pitchFamily="18" charset="0"/>
-              </a:rPr>
-              <a:t>getAuctionByKeyword</a:t>
-            </a:r>
-            <a:r>
-              <a:rPr lang="it-IT" sz="1800" dirty="0">
-                <a:latin typeface="Tenorite (Corpo)"/>
-                <a:ea typeface="Cambria" panose="02040503050406030204" pitchFamily="18" charset="0"/>
-                <a:cs typeface="Cambria" panose="02040503050406030204" pitchFamily="18" charset="0"/>
-              </a:rPr>
-              <a:t> (</a:t>
-            </a:r>
-            <a:r>
-              <a:rPr lang="it-IT" sz="1800" dirty="0" err="1">
-                <a:latin typeface="Tenorite (Corpo)"/>
-                <a:ea typeface="Cambria" panose="02040503050406030204" pitchFamily="18" charset="0"/>
-                <a:cs typeface="Cambria" panose="02040503050406030204" pitchFamily="18" charset="0"/>
-              </a:rPr>
-              <a:t>article</a:t>
-            </a:r>
-            <a:r>
-              <a:rPr lang="it-IT" sz="1800" dirty="0">
-                <a:latin typeface="Tenorite (Corpo)"/>
-                <a:ea typeface="Cambria" panose="02040503050406030204" pitchFamily="18" charset="0"/>
-                <a:cs typeface="Cambria" panose="02040503050406030204" pitchFamily="18" charset="0"/>
-              </a:rPr>
-              <a:t>, </a:t>
-            </a:r>
-            <a:r>
-              <a:rPr lang="it-IT" sz="1800" dirty="0" err="1">
-                <a:latin typeface="Tenorite (Corpo)"/>
-                <a:ea typeface="Cambria" panose="02040503050406030204" pitchFamily="18" charset="0"/>
-                <a:cs typeface="Cambria" panose="02040503050406030204" pitchFamily="18" charset="0"/>
-              </a:rPr>
-              <a:t>userID</a:t>
-            </a:r>
-            <a:r>
-              <a:rPr lang="it-IT" sz="1800" dirty="0">
-                <a:latin typeface="Tenorite (Corpo)"/>
-                <a:ea typeface="Cambria" panose="02040503050406030204" pitchFamily="18" charset="0"/>
-                <a:cs typeface="Cambria" panose="02040503050406030204" pitchFamily="18" charset="0"/>
-              </a:rPr>
-              <a:t>, </a:t>
-            </a:r>
-            <a:r>
-              <a:rPr lang="it-IT" sz="1800" dirty="0" err="1">
-                <a:latin typeface="Tenorite (Corpo)"/>
-                <a:ea typeface="Cambria" panose="02040503050406030204" pitchFamily="18" charset="0"/>
-                <a:cs typeface="Cambria" panose="02040503050406030204" pitchFamily="18" charset="0"/>
-              </a:rPr>
-              <a:t>loginTime</a:t>
-            </a:r>
-            <a:r>
-              <a:rPr lang="it-IT" sz="1800" dirty="0">
-                <a:latin typeface="Tenorite (Corpo)"/>
-                <a:ea typeface="Cambria" panose="02040503050406030204" pitchFamily="18" charset="0"/>
-                <a:cs typeface="Cambria" panose="02040503050406030204" pitchFamily="18" charset="0"/>
-              </a:rPr>
-              <a:t>), close (</a:t>
-            </a:r>
-            <a:r>
-              <a:rPr lang="it-IT" sz="1800" dirty="0" err="1">
-                <a:latin typeface="Tenorite (Corpo)"/>
-                <a:ea typeface="Cambria" panose="02040503050406030204" pitchFamily="18" charset="0"/>
-                <a:cs typeface="Cambria" panose="02040503050406030204" pitchFamily="18" charset="0"/>
-              </a:rPr>
-              <a:t>auctionID</a:t>
-            </a:r>
-            <a:r>
-              <a:rPr lang="it-IT" sz="1800" dirty="0">
-                <a:latin typeface="Tenorite (Corpo)"/>
-                <a:ea typeface="Cambria" panose="02040503050406030204" pitchFamily="18" charset="0"/>
-                <a:cs typeface="Cambria" panose="02040503050406030204" pitchFamily="18" charset="0"/>
-              </a:rPr>
-              <a:t>, </a:t>
-            </a:r>
-            <a:r>
-              <a:rPr lang="it-IT" sz="1800" dirty="0" err="1">
-                <a:latin typeface="Tenorite (Corpo)"/>
-                <a:ea typeface="Cambria" panose="02040503050406030204" pitchFamily="18" charset="0"/>
-                <a:cs typeface="Cambria" panose="02040503050406030204" pitchFamily="18" charset="0"/>
-              </a:rPr>
-              <a:t>userID</a:t>
-            </a:r>
-            <a:r>
-              <a:rPr lang="it-IT" sz="1800" dirty="0">
-                <a:latin typeface="Tenorite (Corpo)"/>
-                <a:ea typeface="Cambria" panose="02040503050406030204" pitchFamily="18" charset="0"/>
-                <a:cs typeface="Cambria" panose="02040503050406030204" pitchFamily="18" charset="0"/>
-              </a:rPr>
-              <a:t>)</a:t>
-            </a:r>
-          </a:p>
-          <a:p>
-            <a:pPr marR="73660" algn="just">
-              <a:lnSpc>
-                <a:spcPct val="115000"/>
-              </a:lnSpc>
-              <a:spcBef>
-                <a:spcPts val="225"/>
-              </a:spcBef>
-            </a:pPr>
-            <a:r>
-              <a:rPr lang="it-IT" sz="1800" dirty="0" err="1">
-                <a:latin typeface="Tenorite (Corpo)"/>
-                <a:ea typeface="Cambria" panose="02040503050406030204" pitchFamily="18" charset="0"/>
-                <a:cs typeface="Cambria" panose="02040503050406030204" pitchFamily="18" charset="0"/>
-              </a:rPr>
-              <a:t>OfferDAO</a:t>
-            </a:r>
-            <a:r>
-              <a:rPr lang="it-IT" sz="1800" dirty="0">
-                <a:latin typeface="Tenorite (Corpo)"/>
-                <a:ea typeface="Cambria" panose="02040503050406030204" pitchFamily="18" charset="0"/>
-                <a:cs typeface="Cambria" panose="02040503050406030204" pitchFamily="18" charset="0"/>
-              </a:rPr>
-              <a:t>: </a:t>
-            </a:r>
-            <a:r>
-              <a:rPr lang="it-IT" sz="1800" dirty="0" err="1">
-                <a:latin typeface="Tenorite (Corpo)"/>
-                <a:ea typeface="Cambria" panose="02040503050406030204" pitchFamily="18" charset="0"/>
-                <a:cs typeface="Cambria" panose="02040503050406030204" pitchFamily="18" charset="0"/>
-              </a:rPr>
-              <a:t>getOffers</a:t>
-            </a:r>
-            <a:r>
-              <a:rPr lang="it-IT" sz="1800" dirty="0">
-                <a:latin typeface="Tenorite (Corpo)"/>
-                <a:ea typeface="Cambria" panose="02040503050406030204" pitchFamily="18" charset="0"/>
-                <a:cs typeface="Cambria" panose="02040503050406030204" pitchFamily="18" charset="0"/>
-              </a:rPr>
-              <a:t> (</a:t>
-            </a:r>
-            <a:r>
-              <a:rPr lang="it-IT" sz="1800" dirty="0" err="1">
-                <a:latin typeface="Tenorite (Corpo)"/>
-                <a:ea typeface="Cambria" panose="02040503050406030204" pitchFamily="18" charset="0"/>
-                <a:cs typeface="Cambria" panose="02040503050406030204" pitchFamily="18" charset="0"/>
-              </a:rPr>
-              <a:t>auctionID</a:t>
-            </a:r>
-            <a:r>
-              <a:rPr lang="it-IT" sz="1800" dirty="0">
-                <a:latin typeface="Tenorite (Corpo)"/>
-                <a:ea typeface="Cambria" panose="02040503050406030204" pitchFamily="18" charset="0"/>
-                <a:cs typeface="Cambria" panose="02040503050406030204" pitchFamily="18" charset="0"/>
-              </a:rPr>
-              <a:t>), </a:t>
-            </a:r>
-            <a:r>
-              <a:rPr lang="it-IT" sz="1800" dirty="0" err="1">
-                <a:latin typeface="Tenorite (Corpo)"/>
-                <a:ea typeface="Cambria" panose="02040503050406030204" pitchFamily="18" charset="0"/>
-                <a:cs typeface="Cambria" panose="02040503050406030204" pitchFamily="18" charset="0"/>
-              </a:rPr>
-              <a:t>addOffer</a:t>
-            </a:r>
-            <a:r>
-              <a:rPr lang="it-IT" sz="1800" dirty="0">
-                <a:latin typeface="Tenorite (Corpo)"/>
-                <a:ea typeface="Cambria" panose="02040503050406030204" pitchFamily="18" charset="0"/>
-                <a:cs typeface="Cambria" panose="02040503050406030204" pitchFamily="18" charset="0"/>
-              </a:rPr>
-              <a:t> (</a:t>
-            </a:r>
-            <a:r>
-              <a:rPr lang="it-IT" sz="1800" dirty="0" err="1">
-                <a:latin typeface="Tenorite (Corpo)"/>
-                <a:ea typeface="Cambria" panose="02040503050406030204" pitchFamily="18" charset="0"/>
-                <a:cs typeface="Cambria" panose="02040503050406030204" pitchFamily="18" charset="0"/>
-              </a:rPr>
-              <a:t>offer</a:t>
-            </a:r>
-            <a:r>
-              <a:rPr lang="it-IT" sz="1800" dirty="0">
-                <a:latin typeface="Tenorite (Corpo)"/>
-                <a:ea typeface="Cambria" panose="02040503050406030204" pitchFamily="18" charset="0"/>
-                <a:cs typeface="Cambria" panose="02040503050406030204" pitchFamily="18" charset="0"/>
-              </a:rPr>
-              <a:t>, </a:t>
-            </a:r>
-            <a:r>
-              <a:rPr lang="it-IT" sz="1800" dirty="0" err="1">
-                <a:latin typeface="Tenorite (Corpo)"/>
-                <a:ea typeface="Cambria" panose="02040503050406030204" pitchFamily="18" charset="0"/>
-                <a:cs typeface="Cambria" panose="02040503050406030204" pitchFamily="18" charset="0"/>
-              </a:rPr>
-              <a:t>userID</a:t>
-            </a:r>
-            <a:r>
-              <a:rPr lang="it-IT" sz="1800" dirty="0">
-                <a:latin typeface="Tenorite (Corpo)"/>
-                <a:ea typeface="Cambria" panose="02040503050406030204" pitchFamily="18" charset="0"/>
-                <a:cs typeface="Cambria" panose="02040503050406030204" pitchFamily="18" charset="0"/>
-              </a:rPr>
-              <a:t>, </a:t>
-            </a:r>
-            <a:r>
-              <a:rPr lang="it-IT" sz="1800" dirty="0" err="1">
-                <a:latin typeface="Tenorite (Corpo)"/>
-                <a:ea typeface="Cambria" panose="02040503050406030204" pitchFamily="18" charset="0"/>
-                <a:cs typeface="Cambria" panose="02040503050406030204" pitchFamily="18" charset="0"/>
-              </a:rPr>
-              <a:t>auctionID</a:t>
-            </a:r>
-            <a:r>
-              <a:rPr lang="it-IT" sz="1800" dirty="0">
-                <a:latin typeface="Tenorite (Corpo)"/>
-                <a:ea typeface="Cambria" panose="02040503050406030204" pitchFamily="18" charset="0"/>
-                <a:cs typeface="Cambria" panose="02040503050406030204" pitchFamily="18" charset="0"/>
-              </a:rPr>
-              <a:t>, date), </a:t>
-            </a:r>
-            <a:r>
-              <a:rPr lang="it-IT" sz="1800" dirty="0" err="1">
-                <a:latin typeface="Tenorite (Corpo)"/>
-                <a:ea typeface="Cambria" panose="02040503050406030204" pitchFamily="18" charset="0"/>
-                <a:cs typeface="Cambria" panose="02040503050406030204" pitchFamily="18" charset="0"/>
-              </a:rPr>
-              <a:t>getMaxOffer</a:t>
-            </a:r>
-            <a:r>
-              <a:rPr lang="it-IT" sz="1800" dirty="0">
-                <a:latin typeface="Tenorite (Corpo)"/>
-                <a:ea typeface="Cambria" panose="02040503050406030204" pitchFamily="18" charset="0"/>
-                <a:cs typeface="Cambria" panose="02040503050406030204" pitchFamily="18" charset="0"/>
-              </a:rPr>
-              <a:t> (</a:t>
-            </a:r>
-            <a:r>
-              <a:rPr lang="it-IT" sz="1800" dirty="0" err="1">
-                <a:latin typeface="Tenorite (Corpo)"/>
-                <a:ea typeface="Cambria" panose="02040503050406030204" pitchFamily="18" charset="0"/>
-                <a:cs typeface="Cambria" panose="02040503050406030204" pitchFamily="18" charset="0"/>
-              </a:rPr>
-              <a:t>auctionID</a:t>
-            </a:r>
-            <a:r>
-              <a:rPr lang="it-IT" sz="1800" dirty="0">
-                <a:latin typeface="Tenorite (Corpo)"/>
-                <a:ea typeface="Cambria" panose="02040503050406030204" pitchFamily="18" charset="0"/>
-                <a:cs typeface="Cambria" panose="02040503050406030204" pitchFamily="18" charset="0"/>
-              </a:rPr>
-              <a:t>)</a:t>
-            </a:r>
-          </a:p>
-          <a:p>
-            <a:pPr marR="73660" algn="just">
-              <a:lnSpc>
-                <a:spcPct val="115000"/>
-              </a:lnSpc>
-              <a:spcBef>
-                <a:spcPts val="225"/>
-              </a:spcBef>
-            </a:pPr>
-            <a:r>
-              <a:rPr lang="it-IT" sz="1800" dirty="0" err="1">
-                <a:latin typeface="Tenorite (Corpo)"/>
-                <a:ea typeface="Cambria" panose="02040503050406030204" pitchFamily="18" charset="0"/>
-                <a:cs typeface="Cambria" panose="02040503050406030204" pitchFamily="18" charset="0"/>
-              </a:rPr>
-              <a:t>ProductDAO</a:t>
-            </a:r>
-            <a:r>
-              <a:rPr lang="it-IT" sz="1800" dirty="0">
-                <a:latin typeface="Tenorite (Corpo)"/>
-                <a:ea typeface="Cambria" panose="02040503050406030204" pitchFamily="18" charset="0"/>
-                <a:cs typeface="Cambria" panose="02040503050406030204" pitchFamily="18" charset="0"/>
-              </a:rPr>
-              <a:t>: </a:t>
-            </a:r>
-            <a:r>
-              <a:rPr lang="it-IT" sz="1800" dirty="0" err="1">
-                <a:latin typeface="Tenorite (Corpo)"/>
-                <a:ea typeface="Cambria" panose="02040503050406030204" pitchFamily="18" charset="0"/>
-                <a:cs typeface="Cambria" panose="02040503050406030204" pitchFamily="18" charset="0"/>
-              </a:rPr>
-              <a:t>addProduct</a:t>
-            </a:r>
-            <a:r>
-              <a:rPr lang="it-IT" sz="1800" dirty="0">
-                <a:latin typeface="Tenorite (Corpo)"/>
-                <a:ea typeface="Cambria" panose="02040503050406030204" pitchFamily="18" charset="0"/>
-                <a:cs typeface="Cambria" panose="02040503050406030204" pitchFamily="18" charset="0"/>
-              </a:rPr>
-              <a:t> (name, </a:t>
-            </a:r>
-            <a:r>
-              <a:rPr lang="it-IT" sz="1800" dirty="0" err="1">
-                <a:latin typeface="Tenorite (Corpo)"/>
-                <a:ea typeface="Cambria" panose="02040503050406030204" pitchFamily="18" charset="0"/>
-                <a:cs typeface="Cambria" panose="02040503050406030204" pitchFamily="18" charset="0"/>
-              </a:rPr>
-              <a:t>description</a:t>
-            </a:r>
-            <a:r>
-              <a:rPr lang="it-IT" sz="1800" dirty="0">
-                <a:latin typeface="Tenorite (Corpo)"/>
-                <a:ea typeface="Cambria" panose="02040503050406030204" pitchFamily="18" charset="0"/>
-                <a:cs typeface="Cambria" panose="02040503050406030204" pitchFamily="18" charset="0"/>
-              </a:rPr>
-              <a:t>, price, </a:t>
-            </a:r>
-            <a:r>
-              <a:rPr lang="it-IT" sz="1800" dirty="0" err="1">
-                <a:latin typeface="Tenorite (Corpo)"/>
-                <a:ea typeface="Cambria" panose="02040503050406030204" pitchFamily="18" charset="0"/>
-                <a:cs typeface="Cambria" panose="02040503050406030204" pitchFamily="18" charset="0"/>
-              </a:rPr>
-              <a:t>userID</a:t>
-            </a:r>
-            <a:r>
-              <a:rPr lang="it-IT" sz="1800" dirty="0">
-                <a:latin typeface="Tenorite (Corpo)"/>
-                <a:ea typeface="Cambria" panose="02040503050406030204" pitchFamily="18" charset="0"/>
-                <a:cs typeface="Cambria" panose="02040503050406030204" pitchFamily="18" charset="0"/>
-              </a:rPr>
-              <a:t>), </a:t>
-            </a:r>
-            <a:r>
-              <a:rPr lang="it-IT" sz="1800" dirty="0" err="1">
-                <a:latin typeface="Tenorite (Corpo)"/>
-                <a:ea typeface="Cambria" panose="02040503050406030204" pitchFamily="18" charset="0"/>
-                <a:cs typeface="Cambria" panose="02040503050406030204" pitchFamily="18" charset="0"/>
-              </a:rPr>
-              <a:t>getUserProducts</a:t>
-            </a:r>
-            <a:r>
-              <a:rPr lang="it-IT" sz="1800" dirty="0">
-                <a:latin typeface="Tenorite (Corpo)"/>
-                <a:ea typeface="Cambria" panose="02040503050406030204" pitchFamily="18" charset="0"/>
-                <a:cs typeface="Cambria" panose="02040503050406030204" pitchFamily="18" charset="0"/>
-              </a:rPr>
-              <a:t> (</a:t>
-            </a:r>
-            <a:r>
-              <a:rPr lang="it-IT" sz="1800" dirty="0" err="1">
-                <a:latin typeface="Tenorite (Corpo)"/>
-                <a:ea typeface="Cambria" panose="02040503050406030204" pitchFamily="18" charset="0"/>
-                <a:cs typeface="Cambria" panose="02040503050406030204" pitchFamily="18" charset="0"/>
-              </a:rPr>
-              <a:t>userID</a:t>
-            </a:r>
-            <a:r>
-              <a:rPr lang="it-IT" sz="1800" dirty="0">
-                <a:latin typeface="Tenorite (Corpo)"/>
-                <a:ea typeface="Cambria" panose="02040503050406030204" pitchFamily="18" charset="0"/>
-                <a:cs typeface="Cambria" panose="02040503050406030204" pitchFamily="18" charset="0"/>
-              </a:rPr>
-              <a:t>), update (</a:t>
-            </a:r>
-            <a:r>
-              <a:rPr lang="it-IT" sz="1800" dirty="0" err="1">
-                <a:latin typeface="Tenorite (Corpo)"/>
-                <a:ea typeface="Cambria" panose="02040503050406030204" pitchFamily="18" charset="0"/>
-                <a:cs typeface="Cambria" panose="02040503050406030204" pitchFamily="18" charset="0"/>
-              </a:rPr>
-              <a:t>productid</a:t>
-            </a:r>
-            <a:r>
-              <a:rPr lang="it-IT" sz="1800" dirty="0">
-                <a:latin typeface="Tenorite (Corpo)"/>
-                <a:ea typeface="Cambria" panose="02040503050406030204" pitchFamily="18" charset="0"/>
-                <a:cs typeface="Cambria" panose="02040503050406030204" pitchFamily="18" charset="0"/>
-              </a:rPr>
-              <a:t>, </a:t>
-            </a:r>
-            <a:r>
-              <a:rPr lang="it-IT" sz="1800" dirty="0" err="1">
-                <a:latin typeface="Tenorite (Corpo)"/>
-                <a:ea typeface="Cambria" panose="02040503050406030204" pitchFamily="18" charset="0"/>
-                <a:cs typeface="Cambria" panose="02040503050406030204" pitchFamily="18" charset="0"/>
-              </a:rPr>
-              <a:t>auctionID</a:t>
-            </a:r>
-            <a:r>
-              <a:rPr lang="it-IT" sz="1800" dirty="0">
-                <a:latin typeface="Tenorite (Corpo)"/>
-                <a:ea typeface="Cambria" panose="02040503050406030204" pitchFamily="18" charset="0"/>
-                <a:cs typeface="Cambria" panose="02040503050406030204" pitchFamily="18" charset="0"/>
-              </a:rPr>
-              <a:t>), </a:t>
-            </a:r>
-            <a:r>
-              <a:rPr lang="it-IT" sz="1800" dirty="0" err="1">
-                <a:latin typeface="Tenorite (Corpo)"/>
-                <a:ea typeface="Cambria" panose="02040503050406030204" pitchFamily="18" charset="0"/>
-                <a:cs typeface="Cambria" panose="02040503050406030204" pitchFamily="18" charset="0"/>
-              </a:rPr>
-              <a:t>getPrice</a:t>
-            </a:r>
-            <a:r>
-              <a:rPr lang="it-IT" sz="1800" dirty="0">
-                <a:latin typeface="Tenorite (Corpo)"/>
-                <a:ea typeface="Cambria" panose="02040503050406030204" pitchFamily="18" charset="0"/>
-                <a:cs typeface="Cambria" panose="02040503050406030204" pitchFamily="18" charset="0"/>
-              </a:rPr>
-              <a:t> (</a:t>
-            </a:r>
-            <a:r>
-              <a:rPr lang="it-IT" sz="1800" dirty="0" err="1">
-                <a:latin typeface="Tenorite (Corpo)"/>
-                <a:ea typeface="Cambria" panose="02040503050406030204" pitchFamily="18" charset="0"/>
-                <a:cs typeface="Cambria" panose="02040503050406030204" pitchFamily="18" charset="0"/>
-              </a:rPr>
-              <a:t>productID</a:t>
-            </a:r>
-            <a:r>
-              <a:rPr lang="it-IT" sz="1800" dirty="0">
-                <a:latin typeface="Tenorite (Corpo)"/>
-                <a:ea typeface="Cambria" panose="02040503050406030204" pitchFamily="18" charset="0"/>
-                <a:cs typeface="Cambria" panose="02040503050406030204" pitchFamily="18" charset="0"/>
-              </a:rPr>
-              <a:t>), </a:t>
-            </a:r>
-            <a:r>
-              <a:rPr lang="it-IT" sz="1800" dirty="0" err="1">
-                <a:latin typeface="Tenorite (Corpo)"/>
-                <a:ea typeface="Cambria" panose="02040503050406030204" pitchFamily="18" charset="0"/>
-                <a:cs typeface="Cambria" panose="02040503050406030204" pitchFamily="18" charset="0"/>
-              </a:rPr>
-              <a:t>checkProduct</a:t>
-            </a:r>
-            <a:r>
-              <a:rPr lang="it-IT" sz="1800" dirty="0">
-                <a:latin typeface="Tenorite (Corpo)"/>
-                <a:ea typeface="Cambria" panose="02040503050406030204" pitchFamily="18" charset="0"/>
-                <a:cs typeface="Cambria" panose="02040503050406030204" pitchFamily="18" charset="0"/>
-              </a:rPr>
-              <a:t> (</a:t>
-            </a:r>
-            <a:r>
-              <a:rPr lang="it-IT" sz="1800" dirty="0" err="1">
-                <a:latin typeface="Tenorite (Corpo)"/>
-                <a:ea typeface="Cambria" panose="02040503050406030204" pitchFamily="18" charset="0"/>
-                <a:cs typeface="Cambria" panose="02040503050406030204" pitchFamily="18" charset="0"/>
-              </a:rPr>
-              <a:t>productid</a:t>
-            </a:r>
-            <a:r>
-              <a:rPr lang="it-IT" sz="1800" dirty="0">
-                <a:latin typeface="Tenorite (Corpo)"/>
-                <a:ea typeface="Cambria" panose="02040503050406030204" pitchFamily="18" charset="0"/>
-                <a:cs typeface="Cambria" panose="02040503050406030204" pitchFamily="18" charset="0"/>
-              </a:rPr>
-              <a:t>, </a:t>
-            </a:r>
-            <a:r>
-              <a:rPr lang="it-IT" sz="1800" dirty="0" err="1">
-                <a:latin typeface="Tenorite (Corpo)"/>
-                <a:ea typeface="Cambria" panose="02040503050406030204" pitchFamily="18" charset="0"/>
-                <a:cs typeface="Cambria" panose="02040503050406030204" pitchFamily="18" charset="0"/>
-              </a:rPr>
-              <a:t>userID</a:t>
-            </a:r>
-            <a:r>
-              <a:rPr lang="it-IT" sz="1800" dirty="0">
-                <a:latin typeface="Tenorite (Corpo)"/>
-                <a:ea typeface="Cambria" panose="02040503050406030204" pitchFamily="18" charset="0"/>
-                <a:cs typeface="Cambria" panose="02040503050406030204" pitchFamily="18" charset="0"/>
-              </a:rPr>
-              <a:t>), </a:t>
-            </a:r>
-            <a:r>
-              <a:rPr lang="it-IT" sz="1800" dirty="0" err="1">
-                <a:latin typeface="Tenorite (Corpo)"/>
-                <a:ea typeface="Cambria" panose="02040503050406030204" pitchFamily="18" charset="0"/>
-                <a:cs typeface="Cambria" panose="02040503050406030204" pitchFamily="18" charset="0"/>
-              </a:rPr>
-              <a:t>getProductFromAuction</a:t>
-            </a:r>
-            <a:r>
-              <a:rPr lang="it-IT" sz="1800" dirty="0">
-                <a:latin typeface="Tenorite (Corpo)"/>
-                <a:ea typeface="Cambria" panose="02040503050406030204" pitchFamily="18" charset="0"/>
-                <a:cs typeface="Cambria" panose="02040503050406030204" pitchFamily="18" charset="0"/>
-              </a:rPr>
-              <a:t> (</a:t>
-            </a:r>
-            <a:r>
-              <a:rPr lang="it-IT" sz="1800" dirty="0" err="1">
-                <a:latin typeface="Tenorite (Corpo)"/>
-                <a:ea typeface="Cambria" panose="02040503050406030204" pitchFamily="18" charset="0"/>
-                <a:cs typeface="Cambria" panose="02040503050406030204" pitchFamily="18" charset="0"/>
-              </a:rPr>
-              <a:t>auctionID</a:t>
-            </a:r>
-            <a:r>
-              <a:rPr lang="it-IT" sz="1800" dirty="0">
-                <a:latin typeface="Tenorite (Corpo)"/>
-                <a:ea typeface="Cambria" panose="02040503050406030204" pitchFamily="18" charset="0"/>
-                <a:cs typeface="Cambria" panose="02040503050406030204" pitchFamily="18" charset="0"/>
-              </a:rPr>
-              <a:t>)</a:t>
-            </a:r>
-          </a:p>
-          <a:p>
-            <a:pPr marR="73660" algn="just">
-              <a:lnSpc>
-                <a:spcPct val="115000"/>
-              </a:lnSpc>
-              <a:spcBef>
-                <a:spcPts val="225"/>
-              </a:spcBef>
-            </a:pPr>
-            <a:r>
-              <a:rPr lang="it-IT" sz="1800" dirty="0" err="1">
-                <a:latin typeface="Tenorite (Corpo)"/>
-                <a:ea typeface="Cambria" panose="02040503050406030204" pitchFamily="18" charset="0"/>
-                <a:cs typeface="Cambria" panose="02040503050406030204" pitchFamily="18" charset="0"/>
-              </a:rPr>
-              <a:t>UserDAO</a:t>
-            </a:r>
-            <a:r>
-              <a:rPr lang="it-IT" sz="1800" dirty="0">
-                <a:latin typeface="Tenorite (Corpo)"/>
-                <a:ea typeface="Cambria" panose="02040503050406030204" pitchFamily="18" charset="0"/>
-                <a:cs typeface="Cambria" panose="02040503050406030204" pitchFamily="18" charset="0"/>
-              </a:rPr>
-              <a:t>: </a:t>
-            </a:r>
-            <a:r>
-              <a:rPr lang="it-IT" sz="1800" dirty="0" err="1">
-                <a:latin typeface="Tenorite (Corpo)"/>
-                <a:ea typeface="Cambria" panose="02040503050406030204" pitchFamily="18" charset="0"/>
-                <a:cs typeface="Cambria" panose="02040503050406030204" pitchFamily="18" charset="0"/>
-              </a:rPr>
-              <a:t>authenticate</a:t>
-            </a:r>
-            <a:r>
-              <a:rPr lang="it-IT" sz="1800" dirty="0">
-                <a:latin typeface="Tenorite (Corpo)"/>
-                <a:ea typeface="Cambria" panose="02040503050406030204" pitchFamily="18" charset="0"/>
-                <a:cs typeface="Cambria" panose="02040503050406030204" pitchFamily="18" charset="0"/>
-              </a:rPr>
-              <a:t> (username, password), </a:t>
-            </a:r>
-            <a:r>
-              <a:rPr lang="it-IT" sz="1800" dirty="0" err="1">
-                <a:latin typeface="Tenorite (Corpo)"/>
-                <a:ea typeface="Cambria" panose="02040503050406030204" pitchFamily="18" charset="0"/>
-                <a:cs typeface="Cambria" panose="02040503050406030204" pitchFamily="18" charset="0"/>
-              </a:rPr>
-              <a:t>addUser</a:t>
-            </a:r>
-            <a:r>
-              <a:rPr lang="it-IT" sz="1800" dirty="0">
-                <a:latin typeface="Tenorite (Corpo)"/>
-                <a:ea typeface="Cambria" panose="02040503050406030204" pitchFamily="18" charset="0"/>
-                <a:cs typeface="Cambria" panose="02040503050406030204" pitchFamily="18" charset="0"/>
-              </a:rPr>
-              <a:t> (username, email, city, address, province, password), </a:t>
-            </a:r>
-            <a:r>
-              <a:rPr lang="it-IT" sz="1800" dirty="0" err="1">
-                <a:latin typeface="Tenorite (Corpo)"/>
-                <a:ea typeface="Cambria" panose="02040503050406030204" pitchFamily="18" charset="0"/>
-                <a:cs typeface="Cambria" panose="02040503050406030204" pitchFamily="18" charset="0"/>
-              </a:rPr>
-              <a:t>getUser</a:t>
-            </a:r>
-            <a:r>
-              <a:rPr lang="it-IT" sz="1800" dirty="0">
-                <a:latin typeface="Tenorite (Corpo)"/>
-                <a:ea typeface="Cambria" panose="02040503050406030204" pitchFamily="18" charset="0"/>
-                <a:cs typeface="Cambria" panose="02040503050406030204" pitchFamily="18" charset="0"/>
-              </a:rPr>
-              <a:t> (</a:t>
-            </a:r>
-            <a:r>
-              <a:rPr lang="it-IT" sz="1800" dirty="0" err="1">
-                <a:latin typeface="Tenorite (Corpo)"/>
-                <a:ea typeface="Cambria" panose="02040503050406030204" pitchFamily="18" charset="0"/>
-                <a:cs typeface="Cambria" panose="02040503050406030204" pitchFamily="18" charset="0"/>
-              </a:rPr>
-              <a:t>userID</a:t>
-            </a:r>
-            <a:r>
-              <a:rPr lang="it-IT" sz="1800" dirty="0">
-                <a:latin typeface="Tenorite (Corpo)"/>
-                <a:ea typeface="Cambria" panose="02040503050406030204" pitchFamily="18" charset="0"/>
-                <a:cs typeface="Cambria" panose="02040503050406030204" pitchFamily="18" charset="0"/>
-              </a:rPr>
-              <a:t>), </a:t>
-            </a:r>
-            <a:r>
-              <a:rPr lang="it-IT" sz="1800" dirty="0" err="1">
-                <a:latin typeface="Tenorite (Corpo)"/>
-                <a:ea typeface="Cambria" panose="02040503050406030204" pitchFamily="18" charset="0"/>
-                <a:cs typeface="Cambria" panose="02040503050406030204" pitchFamily="18" charset="0"/>
-              </a:rPr>
-              <a:t>getUserByUsername</a:t>
-            </a:r>
-            <a:r>
-              <a:rPr lang="it-IT" sz="1800" dirty="0">
-                <a:latin typeface="Tenorite (Corpo)"/>
-                <a:ea typeface="Cambria" panose="02040503050406030204" pitchFamily="18" charset="0"/>
-                <a:cs typeface="Cambria" panose="02040503050406030204" pitchFamily="18" charset="0"/>
-              </a:rPr>
-              <a:t> (username), </a:t>
-            </a:r>
-            <a:r>
-              <a:rPr lang="it-IT" sz="1800" dirty="0" err="1">
-                <a:latin typeface="Tenorite (Corpo)"/>
-                <a:ea typeface="Cambria" panose="02040503050406030204" pitchFamily="18" charset="0"/>
-                <a:cs typeface="Cambria" panose="02040503050406030204" pitchFamily="18" charset="0"/>
-              </a:rPr>
-              <a:t>getUserByEmail</a:t>
-            </a:r>
-            <a:r>
-              <a:rPr lang="it-IT" sz="1800" dirty="0">
-                <a:latin typeface="Tenorite (Corpo)"/>
-                <a:ea typeface="Cambria" panose="02040503050406030204" pitchFamily="18" charset="0"/>
-                <a:cs typeface="Cambria" panose="02040503050406030204" pitchFamily="18" charset="0"/>
-              </a:rPr>
-              <a:t> (email)</a:t>
-            </a:r>
-          </a:p>
-          <a:p>
-            <a:pPr marL="0" marR="73660" indent="0" algn="just">
-              <a:lnSpc>
-                <a:spcPct val="115000"/>
-              </a:lnSpc>
-              <a:spcBef>
-                <a:spcPts val="225"/>
-              </a:spcBef>
-              <a:buNone/>
-            </a:pPr>
-            <a:endParaRPr lang="it-IT" sz="1800" dirty="0">
-              <a:latin typeface="Tenorite (Corpo)"/>
-              <a:ea typeface="Cambria" panose="02040503050406030204" pitchFamily="18" charset="0"/>
-              <a:cs typeface="Cambria" panose="02040503050406030204" pitchFamily="18" charset="0"/>
-            </a:endParaRPr>
-          </a:p>
-        </p:txBody>
-      </p:sp>
-      <p:sp>
-        <p:nvSpPr>
-          <p:cNvPr id="3" name="Segnaposto testo 2">
-            <a:extLst>
-              <a:ext uri="{FF2B5EF4-FFF2-40B4-BE49-F238E27FC236}">
-                <a16:creationId xmlns:a16="http://schemas.microsoft.com/office/drawing/2014/main" id="{EF1ED410-268C-8BBD-1A76-FB3F2DD06402}"/>
-              </a:ext>
-            </a:extLst>
-          </p:cNvPr>
-          <p:cNvSpPr txBox="1">
-            <a:spLocks/>
-          </p:cNvSpPr>
-          <p:nvPr/>
-        </p:nvSpPr>
-        <p:spPr>
-          <a:xfrm>
-            <a:off x="5867400" y="1253444"/>
-            <a:ext cx="3429000" cy="5323267"/>
-          </a:xfrm>
-          <a:prstGeom prst="rect">
-            <a:avLst/>
-          </a:prstGeom>
-        </p:spPr>
-        <p:txBody>
-          <a:bodyPr rtlCol="0">
-            <a:normAutofit/>
-          </a:bodyPr>
-          <a:lstStyle>
-            <a:defPPr>
-              <a:defRPr lang="it-IT"/>
-            </a:defPPr>
-            <a:lvl1pPr marL="228600" indent="-228600" algn="l" defTabSz="914400" rtl="0" eaLnBrk="1" latinLnBrk="0" hangingPunct="1">
-              <a:lnSpc>
-                <a:spcPct val="90000"/>
-              </a:lnSpc>
-              <a:spcBef>
-                <a:spcPts val="1000"/>
-              </a:spcBef>
-              <a:buFont typeface="Arial" panose="020B0604020202020204" pitchFamily="34" charset="0"/>
-              <a:buChar char="•"/>
-              <a:defRPr lang="it-IT" sz="2800" kern="1200">
-                <a:solidFill>
-                  <a:schemeClr val="tx1"/>
-                </a:solidFill>
-                <a:latin typeface="+mn-lt"/>
-                <a:ea typeface="+mn-ea"/>
-                <a:cs typeface="+mn-cs"/>
-              </a:defRPr>
-            </a:lvl1pPr>
-            <a:lvl2pPr marL="685800" indent="-228600" algn="l" defTabSz="914400" rtl="0" eaLnBrk="1" latinLnBrk="0" hangingPunct="1">
-              <a:lnSpc>
-                <a:spcPct val="90000"/>
-              </a:lnSpc>
-              <a:spcBef>
-                <a:spcPts val="500"/>
-              </a:spcBef>
-              <a:buFont typeface="Arial" panose="020B0604020202020204" pitchFamily="34" charset="0"/>
-              <a:buChar char="•"/>
-              <a:defRPr lang="it-IT" sz="2400" kern="1200">
-                <a:solidFill>
-                  <a:schemeClr val="tx1"/>
-                </a:solidFill>
-                <a:latin typeface="+mn-lt"/>
-                <a:ea typeface="+mn-ea"/>
-                <a:cs typeface="+mn-cs"/>
-              </a:defRPr>
-            </a:lvl2pPr>
-            <a:lvl3pPr marL="1143000" indent="-228600" algn="l" defTabSz="914400" rtl="0" eaLnBrk="1" latinLnBrk="0" hangingPunct="1">
-              <a:lnSpc>
-                <a:spcPct val="90000"/>
-              </a:lnSpc>
-              <a:spcBef>
-                <a:spcPts val="500"/>
-              </a:spcBef>
-              <a:buFont typeface="Arial" panose="020B0604020202020204" pitchFamily="34" charset="0"/>
-              <a:buChar char="•"/>
-              <a:defRPr lang="it-IT" sz="2000" kern="1200">
-                <a:solidFill>
-                  <a:schemeClr val="tx1"/>
-                </a:solidFill>
-                <a:latin typeface="+mn-lt"/>
-                <a:ea typeface="+mn-ea"/>
-                <a:cs typeface="+mn-cs"/>
-              </a:defRPr>
-            </a:lvl3pPr>
-            <a:lvl4pPr marL="1600200" indent="-228600" algn="l" defTabSz="914400" rtl="0" eaLnBrk="1" latinLnBrk="0" hangingPunct="1">
-              <a:lnSpc>
-                <a:spcPct val="90000"/>
-              </a:lnSpc>
-              <a:spcBef>
-                <a:spcPts val="500"/>
-              </a:spcBef>
-              <a:buFont typeface="Arial" panose="020B0604020202020204" pitchFamily="34" charset="0"/>
-              <a:buChar char="•"/>
-              <a:defRPr lang="it-IT" sz="1800" kern="1200">
-                <a:solidFill>
-                  <a:schemeClr val="tx1"/>
-                </a:solidFill>
-                <a:latin typeface="+mn-lt"/>
-                <a:ea typeface="+mn-ea"/>
-                <a:cs typeface="+mn-cs"/>
-              </a:defRPr>
-            </a:lvl4pPr>
-            <a:lvl5pPr marL="2057400" indent="-228600" algn="l" defTabSz="914400" rtl="0" eaLnBrk="1" latinLnBrk="0" hangingPunct="1">
-              <a:lnSpc>
-                <a:spcPct val="90000"/>
-              </a:lnSpc>
-              <a:spcBef>
-                <a:spcPts val="500"/>
-              </a:spcBef>
-              <a:buFont typeface="Arial" panose="020B0604020202020204" pitchFamily="34" charset="0"/>
-              <a:buChar char="•"/>
-              <a:defRPr lang="it-IT" sz="1800" kern="1200">
-                <a:solidFill>
-                  <a:schemeClr val="tx1"/>
-                </a:solidFill>
-                <a:latin typeface="+mn-lt"/>
-                <a:ea typeface="+mn-ea"/>
-                <a:cs typeface="+mn-cs"/>
-              </a:defRPr>
-            </a:lvl5pPr>
-            <a:lvl6pPr marL="2514600" indent="-228600" algn="l" defTabSz="914400" rtl="0" eaLnBrk="1" latinLnBrk="0" hangingPunct="1">
-              <a:lnSpc>
-                <a:spcPct val="90000"/>
-              </a:lnSpc>
-              <a:spcBef>
-                <a:spcPts val="500"/>
-              </a:spcBef>
-              <a:buFont typeface="Arial" panose="020B0604020202020204" pitchFamily="34" charset="0"/>
-              <a:buChar char="•"/>
-              <a:defRPr lang="it-IT" sz="1800" kern="1200">
-                <a:solidFill>
-                  <a:schemeClr val="tx1"/>
-                </a:solidFill>
-                <a:latin typeface="+mn-lt"/>
-                <a:ea typeface="+mn-ea"/>
-                <a:cs typeface="+mn-cs"/>
-              </a:defRPr>
-            </a:lvl6pPr>
-            <a:lvl7pPr marL="2971800" indent="-228600" algn="l" defTabSz="914400" rtl="0" eaLnBrk="1" latinLnBrk="0" hangingPunct="1">
-              <a:lnSpc>
-                <a:spcPct val="90000"/>
-              </a:lnSpc>
-              <a:spcBef>
-                <a:spcPts val="500"/>
-              </a:spcBef>
-              <a:buFont typeface="Arial" panose="020B0604020202020204" pitchFamily="34" charset="0"/>
-              <a:buChar char="•"/>
-              <a:defRPr lang="it-IT" sz="1800" kern="1200">
-                <a:solidFill>
-                  <a:schemeClr val="tx1"/>
-                </a:solidFill>
-                <a:latin typeface="+mn-lt"/>
-                <a:ea typeface="+mn-ea"/>
-                <a:cs typeface="+mn-cs"/>
-              </a:defRPr>
-            </a:lvl7pPr>
-            <a:lvl8pPr marL="3429000" indent="-228600" algn="l" defTabSz="914400" rtl="0" eaLnBrk="1" latinLnBrk="0" hangingPunct="1">
-              <a:lnSpc>
-                <a:spcPct val="90000"/>
-              </a:lnSpc>
-              <a:spcBef>
-                <a:spcPts val="500"/>
-              </a:spcBef>
-              <a:buFont typeface="Arial" panose="020B0604020202020204" pitchFamily="34" charset="0"/>
-              <a:buChar char="•"/>
-              <a:defRPr lang="it-IT" sz="1800" kern="1200">
-                <a:solidFill>
-                  <a:schemeClr val="tx1"/>
-                </a:solidFill>
-                <a:latin typeface="+mn-lt"/>
-                <a:ea typeface="+mn-ea"/>
-                <a:cs typeface="+mn-cs"/>
-              </a:defRPr>
-            </a:lvl8pPr>
-            <a:lvl9pPr marL="3886200" indent="-228600" algn="l" defTabSz="914400" rtl="0" eaLnBrk="1" latinLnBrk="0" hangingPunct="1">
-              <a:lnSpc>
-                <a:spcPct val="90000"/>
-              </a:lnSpc>
-              <a:spcBef>
-                <a:spcPts val="500"/>
-              </a:spcBef>
-              <a:buFont typeface="Arial" panose="020B0604020202020204" pitchFamily="34" charset="0"/>
-              <a:buChar char="•"/>
-              <a:defRPr lang="it-IT" sz="1800" kern="1200">
-                <a:solidFill>
-                  <a:schemeClr val="tx1"/>
-                </a:solidFill>
-                <a:latin typeface="+mn-lt"/>
-                <a:ea typeface="+mn-ea"/>
-                <a:cs typeface="+mn-cs"/>
-              </a:defRPr>
-            </a:lvl9pPr>
-          </a:lstStyle>
-          <a:p>
-            <a:pPr marL="0" marR="73660" indent="0" algn="just">
-              <a:lnSpc>
-                <a:spcPct val="115000"/>
-              </a:lnSpc>
-              <a:spcBef>
-                <a:spcPts val="225"/>
-              </a:spcBef>
-              <a:buNone/>
-            </a:pPr>
-            <a:r>
-              <a:rPr lang="en-US" sz="1800" b="1" dirty="0">
-                <a:latin typeface="Tenorite (Corpo)"/>
-                <a:ea typeface="Cambria" panose="02040503050406030204" pitchFamily="18" charset="0"/>
-                <a:cs typeface="Cambria" panose="02040503050406030204" pitchFamily="18" charset="0"/>
-              </a:rPr>
-              <a:t>Model objects:</a:t>
-            </a:r>
-          </a:p>
-          <a:p>
-            <a:pPr marR="73660" algn="just">
-              <a:lnSpc>
-                <a:spcPct val="115000"/>
-              </a:lnSpc>
-              <a:spcBef>
-                <a:spcPts val="225"/>
-              </a:spcBef>
-            </a:pPr>
-            <a:r>
-              <a:rPr lang="en-US" sz="1800" dirty="0" err="1">
-                <a:latin typeface="Tenorite (Corpo)"/>
-                <a:ea typeface="Cambria" panose="02040503050406030204" pitchFamily="18" charset="0"/>
-                <a:cs typeface="Cambria" panose="02040503050406030204" pitchFamily="18" charset="0"/>
-              </a:rPr>
-              <a:t>AuctionBean</a:t>
-            </a:r>
-            <a:endParaRPr lang="en-US" sz="1800" dirty="0">
-              <a:latin typeface="Tenorite (Corpo)"/>
-              <a:ea typeface="Cambria" panose="02040503050406030204" pitchFamily="18" charset="0"/>
-              <a:cs typeface="Cambria" panose="02040503050406030204" pitchFamily="18" charset="0"/>
-            </a:endParaRPr>
-          </a:p>
-          <a:p>
-            <a:pPr marR="73660" algn="just">
-              <a:lnSpc>
-                <a:spcPct val="115000"/>
-              </a:lnSpc>
-              <a:spcBef>
-                <a:spcPts val="225"/>
-              </a:spcBef>
-            </a:pPr>
-            <a:r>
-              <a:rPr lang="en-US" sz="1800" dirty="0" err="1">
-                <a:latin typeface="Tenorite (Corpo)"/>
-                <a:ea typeface="Cambria" panose="02040503050406030204" pitchFamily="18" charset="0"/>
-                <a:cs typeface="Cambria" panose="02040503050406030204" pitchFamily="18" charset="0"/>
-              </a:rPr>
-              <a:t>OfferBean</a:t>
-            </a:r>
-            <a:endParaRPr lang="en-US" sz="1800" dirty="0">
-              <a:latin typeface="Tenorite (Corpo)"/>
-              <a:ea typeface="Cambria" panose="02040503050406030204" pitchFamily="18" charset="0"/>
-              <a:cs typeface="Cambria" panose="02040503050406030204" pitchFamily="18" charset="0"/>
-            </a:endParaRPr>
-          </a:p>
-          <a:p>
-            <a:pPr marR="73660" algn="just">
-              <a:lnSpc>
-                <a:spcPct val="115000"/>
-              </a:lnSpc>
-              <a:spcBef>
-                <a:spcPts val="225"/>
-              </a:spcBef>
-            </a:pPr>
-            <a:r>
-              <a:rPr lang="en-US" sz="1800" dirty="0" err="1">
-                <a:latin typeface="Tenorite (Corpo)"/>
-                <a:ea typeface="Cambria" panose="02040503050406030204" pitchFamily="18" charset="0"/>
-                <a:cs typeface="Cambria" panose="02040503050406030204" pitchFamily="18" charset="0"/>
-              </a:rPr>
-              <a:t>ProductBean</a:t>
-            </a:r>
-            <a:endParaRPr lang="en-US" sz="1800" dirty="0">
-              <a:latin typeface="Tenorite (Corpo)"/>
-              <a:ea typeface="Cambria" panose="02040503050406030204" pitchFamily="18" charset="0"/>
-              <a:cs typeface="Cambria" panose="02040503050406030204" pitchFamily="18" charset="0"/>
-            </a:endParaRPr>
-          </a:p>
-          <a:p>
-            <a:pPr marR="73660" algn="just">
-              <a:lnSpc>
-                <a:spcPct val="115000"/>
-              </a:lnSpc>
-              <a:spcBef>
-                <a:spcPts val="225"/>
-              </a:spcBef>
-            </a:pPr>
-            <a:r>
-              <a:rPr lang="en-US" sz="1800" dirty="0" err="1">
-                <a:latin typeface="Tenorite (Corpo)"/>
-                <a:ea typeface="Cambria" panose="02040503050406030204" pitchFamily="18" charset="0"/>
-                <a:cs typeface="Cambria" panose="02040503050406030204" pitchFamily="18" charset="0"/>
-              </a:rPr>
-              <a:t>UserBean</a:t>
-            </a:r>
-            <a:endParaRPr lang="en-US" sz="1800" dirty="0">
-              <a:latin typeface="Tenorite (Corpo)"/>
-              <a:ea typeface="Cambria" panose="02040503050406030204" pitchFamily="18" charset="0"/>
-              <a:cs typeface="Cambria" panose="02040503050406030204" pitchFamily="18" charset="0"/>
-            </a:endParaRPr>
-          </a:p>
-          <a:p>
-            <a:pPr marL="0" marR="73660" indent="0" algn="just">
-              <a:lnSpc>
-                <a:spcPct val="115000"/>
-              </a:lnSpc>
-              <a:spcBef>
-                <a:spcPts val="225"/>
-              </a:spcBef>
-              <a:buNone/>
-            </a:pPr>
-            <a:endParaRPr lang="it-IT" sz="1800" dirty="0">
-              <a:latin typeface="Tenorite (Corpo)"/>
-              <a:ea typeface="Cambria" panose="02040503050406030204" pitchFamily="18" charset="0"/>
-              <a:cs typeface="Cambria" panose="02040503050406030204" pitchFamily="18" charset="0"/>
-            </a:endParaRPr>
-          </a:p>
-          <a:p>
-            <a:pPr marL="0" marR="73660" indent="0" algn="just">
-              <a:lnSpc>
-                <a:spcPct val="115000"/>
-              </a:lnSpc>
-              <a:spcBef>
-                <a:spcPts val="225"/>
-              </a:spcBef>
-              <a:buNone/>
-            </a:pPr>
-            <a:r>
-              <a:rPr lang="it-IT" sz="1800" b="1" dirty="0">
-                <a:latin typeface="Tenorite (Corpo)"/>
-                <a:ea typeface="Cambria" panose="02040503050406030204" pitchFamily="18" charset="0"/>
-                <a:cs typeface="Cambria" panose="02040503050406030204" pitchFamily="18" charset="0"/>
-              </a:rPr>
-              <a:t>Filters:</a:t>
-            </a:r>
-          </a:p>
-          <a:p>
-            <a:pPr marR="73660" algn="just">
-              <a:lnSpc>
-                <a:spcPct val="115000"/>
-              </a:lnSpc>
-              <a:spcBef>
-                <a:spcPts val="225"/>
-              </a:spcBef>
-            </a:pPr>
-            <a:r>
-              <a:rPr lang="it-IT" sz="1800" dirty="0" err="1">
-                <a:latin typeface="Tenorite (Corpo)"/>
-                <a:ea typeface="Cambria" panose="02040503050406030204" pitchFamily="18" charset="0"/>
-                <a:cs typeface="Cambria" panose="02040503050406030204" pitchFamily="18" charset="0"/>
-              </a:rPr>
-              <a:t>AuthFilter</a:t>
-            </a:r>
-            <a:endParaRPr lang="it-IT" sz="1800" dirty="0">
-              <a:latin typeface="Tenorite (Corpo)"/>
-              <a:ea typeface="Cambria" panose="02040503050406030204" pitchFamily="18" charset="0"/>
-              <a:cs typeface="Cambria" panose="02040503050406030204" pitchFamily="18" charset="0"/>
-            </a:endParaRPr>
-          </a:p>
-          <a:p>
-            <a:pPr marR="73660" algn="just">
-              <a:lnSpc>
-                <a:spcPct val="115000"/>
-              </a:lnSpc>
-              <a:spcBef>
-                <a:spcPts val="225"/>
-              </a:spcBef>
-            </a:pPr>
-            <a:r>
-              <a:rPr lang="it-IT" sz="1800" dirty="0" err="1">
-                <a:latin typeface="Tenorite (Corpo)"/>
-                <a:ea typeface="Cambria" panose="02040503050406030204" pitchFamily="18" charset="0"/>
-                <a:cs typeface="Cambria" panose="02040503050406030204" pitchFamily="18" charset="0"/>
-              </a:rPr>
-              <a:t>UnAuthFilter</a:t>
-            </a:r>
-            <a:endParaRPr lang="it-IT" sz="1800" dirty="0">
-              <a:latin typeface="Tenorite (Corpo)"/>
-              <a:ea typeface="Cambria" panose="02040503050406030204" pitchFamily="18" charset="0"/>
-              <a:cs typeface="Cambria" panose="02040503050406030204" pitchFamily="18" charset="0"/>
-            </a:endParaRPr>
-          </a:p>
-          <a:p>
-            <a:pPr marL="0" marR="73660" indent="0" algn="just">
-              <a:lnSpc>
-                <a:spcPct val="115000"/>
-              </a:lnSpc>
-              <a:spcBef>
-                <a:spcPts val="225"/>
-              </a:spcBef>
-              <a:buNone/>
-            </a:pPr>
-            <a:endParaRPr lang="it-IT" sz="1800" dirty="0">
-              <a:latin typeface="Tenorite (Corpo)"/>
-              <a:ea typeface="Cambria" panose="02040503050406030204" pitchFamily="18" charset="0"/>
-              <a:cs typeface="Cambria" panose="02040503050406030204" pitchFamily="18" charset="0"/>
-            </a:endParaRPr>
-          </a:p>
-        </p:txBody>
-      </p:sp>
-      <p:sp>
-        <p:nvSpPr>
-          <p:cNvPr id="4" name="Segnaposto testo 2">
-            <a:extLst>
-              <a:ext uri="{FF2B5EF4-FFF2-40B4-BE49-F238E27FC236}">
-                <a16:creationId xmlns:a16="http://schemas.microsoft.com/office/drawing/2014/main" id="{44625956-B967-A1DF-A3E5-3C63075B9AB7}"/>
-              </a:ext>
-            </a:extLst>
-          </p:cNvPr>
-          <p:cNvSpPr txBox="1">
-            <a:spLocks/>
-          </p:cNvSpPr>
-          <p:nvPr/>
-        </p:nvSpPr>
-        <p:spPr>
-          <a:xfrm>
-            <a:off x="8839199" y="1385297"/>
-            <a:ext cx="2957245" cy="4971053"/>
-          </a:xfrm>
-          <a:prstGeom prst="rect">
-            <a:avLst/>
-          </a:prstGeom>
-        </p:spPr>
-        <p:txBody>
-          <a:bodyPr rtlCol="0">
-            <a:normAutofit/>
-          </a:bodyPr>
-          <a:lstStyle>
-            <a:defPPr>
-              <a:defRPr lang="it-IT"/>
-            </a:defPPr>
-            <a:lvl1pPr marL="228600" indent="-228600" algn="l" defTabSz="914400" rtl="0" eaLnBrk="1" latinLnBrk="0" hangingPunct="1">
-              <a:lnSpc>
-                <a:spcPct val="90000"/>
-              </a:lnSpc>
-              <a:spcBef>
-                <a:spcPts val="1000"/>
-              </a:spcBef>
-              <a:buFont typeface="Arial" panose="020B0604020202020204" pitchFamily="34" charset="0"/>
-              <a:buChar char="•"/>
-              <a:defRPr lang="it-IT" sz="2800" kern="1200">
-                <a:solidFill>
-                  <a:schemeClr val="tx1"/>
-                </a:solidFill>
-                <a:latin typeface="+mn-lt"/>
-                <a:ea typeface="+mn-ea"/>
-                <a:cs typeface="+mn-cs"/>
-              </a:defRPr>
-            </a:lvl1pPr>
-            <a:lvl2pPr marL="685800" indent="-228600" algn="l" defTabSz="914400" rtl="0" eaLnBrk="1" latinLnBrk="0" hangingPunct="1">
-              <a:lnSpc>
-                <a:spcPct val="90000"/>
-              </a:lnSpc>
-              <a:spcBef>
-                <a:spcPts val="500"/>
-              </a:spcBef>
-              <a:buFont typeface="Arial" panose="020B0604020202020204" pitchFamily="34" charset="0"/>
-              <a:buChar char="•"/>
-              <a:defRPr lang="it-IT" sz="2400" kern="1200">
-                <a:solidFill>
-                  <a:schemeClr val="tx1"/>
-                </a:solidFill>
-                <a:latin typeface="+mn-lt"/>
-                <a:ea typeface="+mn-ea"/>
-                <a:cs typeface="+mn-cs"/>
-              </a:defRPr>
-            </a:lvl2pPr>
-            <a:lvl3pPr marL="1143000" indent="-228600" algn="l" defTabSz="914400" rtl="0" eaLnBrk="1" latinLnBrk="0" hangingPunct="1">
-              <a:lnSpc>
-                <a:spcPct val="90000"/>
-              </a:lnSpc>
-              <a:spcBef>
-                <a:spcPts val="500"/>
-              </a:spcBef>
-              <a:buFont typeface="Arial" panose="020B0604020202020204" pitchFamily="34" charset="0"/>
-              <a:buChar char="•"/>
-              <a:defRPr lang="it-IT" sz="2000" kern="1200">
-                <a:solidFill>
-                  <a:schemeClr val="tx1"/>
-                </a:solidFill>
-                <a:latin typeface="+mn-lt"/>
-                <a:ea typeface="+mn-ea"/>
-                <a:cs typeface="+mn-cs"/>
-              </a:defRPr>
-            </a:lvl3pPr>
-            <a:lvl4pPr marL="1600200" indent="-228600" algn="l" defTabSz="914400" rtl="0" eaLnBrk="1" latinLnBrk="0" hangingPunct="1">
-              <a:lnSpc>
-                <a:spcPct val="90000"/>
-              </a:lnSpc>
-              <a:spcBef>
-                <a:spcPts val="500"/>
-              </a:spcBef>
-              <a:buFont typeface="Arial" panose="020B0604020202020204" pitchFamily="34" charset="0"/>
-              <a:buChar char="•"/>
-              <a:defRPr lang="it-IT" sz="1800" kern="1200">
-                <a:solidFill>
-                  <a:schemeClr val="tx1"/>
-                </a:solidFill>
-                <a:latin typeface="+mn-lt"/>
-                <a:ea typeface="+mn-ea"/>
-                <a:cs typeface="+mn-cs"/>
-              </a:defRPr>
-            </a:lvl4pPr>
-            <a:lvl5pPr marL="2057400" indent="-228600" algn="l" defTabSz="914400" rtl="0" eaLnBrk="1" latinLnBrk="0" hangingPunct="1">
-              <a:lnSpc>
-                <a:spcPct val="90000"/>
-              </a:lnSpc>
-              <a:spcBef>
-                <a:spcPts val="500"/>
-              </a:spcBef>
-              <a:buFont typeface="Arial" panose="020B0604020202020204" pitchFamily="34" charset="0"/>
-              <a:buChar char="•"/>
-              <a:defRPr lang="it-IT" sz="1800" kern="1200">
-                <a:solidFill>
-                  <a:schemeClr val="tx1"/>
-                </a:solidFill>
-                <a:latin typeface="+mn-lt"/>
-                <a:ea typeface="+mn-ea"/>
-                <a:cs typeface="+mn-cs"/>
-              </a:defRPr>
-            </a:lvl5pPr>
-            <a:lvl6pPr marL="2514600" indent="-228600" algn="l" defTabSz="914400" rtl="0" eaLnBrk="1" latinLnBrk="0" hangingPunct="1">
-              <a:lnSpc>
-                <a:spcPct val="90000"/>
-              </a:lnSpc>
-              <a:spcBef>
-                <a:spcPts val="500"/>
-              </a:spcBef>
-              <a:buFont typeface="Arial" panose="020B0604020202020204" pitchFamily="34" charset="0"/>
-              <a:buChar char="•"/>
-              <a:defRPr lang="it-IT" sz="1800" kern="1200">
-                <a:solidFill>
-                  <a:schemeClr val="tx1"/>
-                </a:solidFill>
-                <a:latin typeface="+mn-lt"/>
-                <a:ea typeface="+mn-ea"/>
-                <a:cs typeface="+mn-cs"/>
-              </a:defRPr>
-            </a:lvl6pPr>
-            <a:lvl7pPr marL="2971800" indent="-228600" algn="l" defTabSz="914400" rtl="0" eaLnBrk="1" latinLnBrk="0" hangingPunct="1">
-              <a:lnSpc>
-                <a:spcPct val="90000"/>
-              </a:lnSpc>
-              <a:spcBef>
-                <a:spcPts val="500"/>
-              </a:spcBef>
-              <a:buFont typeface="Arial" panose="020B0604020202020204" pitchFamily="34" charset="0"/>
-              <a:buChar char="•"/>
-              <a:defRPr lang="it-IT" sz="1800" kern="1200">
-                <a:solidFill>
-                  <a:schemeClr val="tx1"/>
-                </a:solidFill>
-                <a:latin typeface="+mn-lt"/>
-                <a:ea typeface="+mn-ea"/>
-                <a:cs typeface="+mn-cs"/>
-              </a:defRPr>
-            </a:lvl7pPr>
-            <a:lvl8pPr marL="3429000" indent="-228600" algn="l" defTabSz="914400" rtl="0" eaLnBrk="1" latinLnBrk="0" hangingPunct="1">
-              <a:lnSpc>
-                <a:spcPct val="90000"/>
-              </a:lnSpc>
-              <a:spcBef>
-                <a:spcPts val="500"/>
-              </a:spcBef>
-              <a:buFont typeface="Arial" panose="020B0604020202020204" pitchFamily="34" charset="0"/>
-              <a:buChar char="•"/>
-              <a:defRPr lang="it-IT" sz="1800" kern="1200">
-                <a:solidFill>
-                  <a:schemeClr val="tx1"/>
-                </a:solidFill>
-                <a:latin typeface="+mn-lt"/>
-                <a:ea typeface="+mn-ea"/>
-                <a:cs typeface="+mn-cs"/>
-              </a:defRPr>
-            </a:lvl8pPr>
-            <a:lvl9pPr marL="3886200" indent="-228600" algn="l" defTabSz="914400" rtl="0" eaLnBrk="1" latinLnBrk="0" hangingPunct="1">
-              <a:lnSpc>
-                <a:spcPct val="90000"/>
-              </a:lnSpc>
-              <a:spcBef>
-                <a:spcPts val="500"/>
-              </a:spcBef>
-              <a:buFont typeface="Arial" panose="020B0604020202020204" pitchFamily="34" charset="0"/>
-              <a:buChar char="•"/>
-              <a:defRPr lang="it-IT" sz="1800" kern="1200">
-                <a:solidFill>
-                  <a:schemeClr val="tx1"/>
-                </a:solidFill>
-                <a:latin typeface="+mn-lt"/>
-                <a:ea typeface="+mn-ea"/>
-                <a:cs typeface="+mn-cs"/>
-              </a:defRPr>
-            </a:lvl9pPr>
-          </a:lstStyle>
-          <a:p>
-            <a:pPr marL="0" marR="73660" indent="0" algn="just">
-              <a:lnSpc>
-                <a:spcPct val="115000"/>
-              </a:lnSpc>
-              <a:spcBef>
-                <a:spcPts val="225"/>
-              </a:spcBef>
-              <a:buNone/>
-            </a:pPr>
-            <a:r>
-              <a:rPr lang="it-IT" sz="1800" b="1" dirty="0">
-                <a:latin typeface="Tenorite (Corpo)"/>
-                <a:ea typeface="Cambria" panose="02040503050406030204" pitchFamily="18" charset="0"/>
-                <a:cs typeface="Cambria" panose="02040503050406030204" pitchFamily="18" charset="0"/>
-              </a:rPr>
-              <a:t>Controllers:</a:t>
-            </a:r>
-          </a:p>
-          <a:p>
-            <a:pPr marR="73660" algn="just">
-              <a:lnSpc>
-                <a:spcPct val="115000"/>
-              </a:lnSpc>
-              <a:spcBef>
-                <a:spcPts val="225"/>
-              </a:spcBef>
-            </a:pPr>
-            <a:r>
-              <a:rPr lang="it-IT" sz="1800" dirty="0" err="1">
-                <a:latin typeface="Tenorite (Corpo)"/>
-                <a:ea typeface="Cambria" panose="02040503050406030204" pitchFamily="18" charset="0"/>
-                <a:cs typeface="Cambria" panose="02040503050406030204" pitchFamily="18" charset="0"/>
-              </a:rPr>
-              <a:t>DoAddProduct</a:t>
-            </a:r>
-            <a:endParaRPr lang="it-IT" sz="1800" dirty="0">
-              <a:latin typeface="Tenorite (Corpo)"/>
-              <a:ea typeface="Cambria" panose="02040503050406030204" pitchFamily="18" charset="0"/>
-              <a:cs typeface="Cambria" panose="02040503050406030204" pitchFamily="18" charset="0"/>
-            </a:endParaRPr>
-          </a:p>
-          <a:p>
-            <a:pPr marR="73660" algn="just">
-              <a:lnSpc>
-                <a:spcPct val="115000"/>
-              </a:lnSpc>
-              <a:spcBef>
-                <a:spcPts val="225"/>
-              </a:spcBef>
-            </a:pPr>
-            <a:r>
-              <a:rPr lang="it-IT" sz="1800" dirty="0" err="1">
-                <a:latin typeface="Tenorite (Corpo)"/>
-                <a:ea typeface="Cambria" panose="02040503050406030204" pitchFamily="18" charset="0"/>
-                <a:cs typeface="Cambria" panose="02040503050406030204" pitchFamily="18" charset="0"/>
-              </a:rPr>
-              <a:t>DoClose</a:t>
-            </a:r>
-            <a:endParaRPr lang="it-IT" sz="1800" dirty="0">
-              <a:latin typeface="Tenorite (Corpo)"/>
-              <a:ea typeface="Cambria" panose="02040503050406030204" pitchFamily="18" charset="0"/>
-              <a:cs typeface="Cambria" panose="02040503050406030204" pitchFamily="18" charset="0"/>
-            </a:endParaRPr>
-          </a:p>
-          <a:p>
-            <a:pPr marR="73660" algn="just">
-              <a:lnSpc>
-                <a:spcPct val="115000"/>
-              </a:lnSpc>
-              <a:spcBef>
-                <a:spcPts val="225"/>
-              </a:spcBef>
-            </a:pPr>
-            <a:r>
-              <a:rPr lang="it-IT" sz="1800" dirty="0" err="1">
-                <a:latin typeface="Tenorite (Corpo)"/>
-                <a:ea typeface="Cambria" panose="02040503050406030204" pitchFamily="18" charset="0"/>
-                <a:cs typeface="Cambria" panose="02040503050406030204" pitchFamily="18" charset="0"/>
-              </a:rPr>
-              <a:t>DoCreateAuction</a:t>
-            </a:r>
-            <a:endParaRPr lang="it-IT" sz="1800" dirty="0">
-              <a:latin typeface="Tenorite (Corpo)"/>
-              <a:ea typeface="Cambria" panose="02040503050406030204" pitchFamily="18" charset="0"/>
-              <a:cs typeface="Cambria" panose="02040503050406030204" pitchFamily="18" charset="0"/>
-            </a:endParaRPr>
-          </a:p>
-          <a:p>
-            <a:pPr marR="73660" algn="just">
-              <a:lnSpc>
-                <a:spcPct val="115000"/>
-              </a:lnSpc>
-              <a:spcBef>
-                <a:spcPts val="225"/>
-              </a:spcBef>
-            </a:pPr>
-            <a:r>
-              <a:rPr lang="it-IT" sz="1800" dirty="0" err="1">
-                <a:latin typeface="Tenorite (Corpo)"/>
-                <a:ea typeface="Cambria" panose="02040503050406030204" pitchFamily="18" charset="0"/>
-                <a:cs typeface="Cambria" panose="02040503050406030204" pitchFamily="18" charset="0"/>
-              </a:rPr>
-              <a:t>DoGetImage</a:t>
-            </a:r>
-            <a:endParaRPr lang="it-IT" sz="1800" dirty="0">
-              <a:latin typeface="Tenorite (Corpo)"/>
-              <a:ea typeface="Cambria" panose="02040503050406030204" pitchFamily="18" charset="0"/>
-              <a:cs typeface="Cambria" panose="02040503050406030204" pitchFamily="18" charset="0"/>
-            </a:endParaRPr>
-          </a:p>
-          <a:p>
-            <a:pPr marR="73660" algn="just">
-              <a:lnSpc>
-                <a:spcPct val="115000"/>
-              </a:lnSpc>
-              <a:spcBef>
-                <a:spcPts val="225"/>
-              </a:spcBef>
-            </a:pPr>
-            <a:r>
-              <a:rPr lang="it-IT" sz="1800" dirty="0" err="1">
-                <a:latin typeface="Tenorite (Corpo)"/>
-                <a:ea typeface="Cambria" panose="02040503050406030204" pitchFamily="18" charset="0"/>
-                <a:cs typeface="Cambria" panose="02040503050406030204" pitchFamily="18" charset="0"/>
-              </a:rPr>
-              <a:t>DoLogin</a:t>
-            </a:r>
-            <a:endParaRPr lang="it-IT" sz="1800" dirty="0">
-              <a:latin typeface="Tenorite (Corpo)"/>
-              <a:ea typeface="Cambria" panose="02040503050406030204" pitchFamily="18" charset="0"/>
-              <a:cs typeface="Cambria" panose="02040503050406030204" pitchFamily="18" charset="0"/>
-            </a:endParaRPr>
-          </a:p>
-          <a:p>
-            <a:pPr marR="73660" algn="just">
-              <a:lnSpc>
-                <a:spcPct val="115000"/>
-              </a:lnSpc>
-              <a:spcBef>
-                <a:spcPts val="225"/>
-              </a:spcBef>
-            </a:pPr>
-            <a:r>
-              <a:rPr lang="it-IT" sz="1800" dirty="0" err="1">
-                <a:latin typeface="Tenorite (Corpo)"/>
-                <a:ea typeface="Cambria" panose="02040503050406030204" pitchFamily="18" charset="0"/>
-                <a:cs typeface="Cambria" panose="02040503050406030204" pitchFamily="18" charset="0"/>
-              </a:rPr>
-              <a:t>DoLogout</a:t>
-            </a:r>
-            <a:endParaRPr lang="it-IT" sz="1800" dirty="0">
-              <a:latin typeface="Tenorite (Corpo)"/>
-              <a:ea typeface="Cambria" panose="02040503050406030204" pitchFamily="18" charset="0"/>
-              <a:cs typeface="Cambria" panose="02040503050406030204" pitchFamily="18" charset="0"/>
-            </a:endParaRPr>
-          </a:p>
-          <a:p>
-            <a:pPr marR="73660" algn="just">
-              <a:lnSpc>
-                <a:spcPct val="115000"/>
-              </a:lnSpc>
-              <a:spcBef>
-                <a:spcPts val="225"/>
-              </a:spcBef>
-            </a:pPr>
-            <a:r>
-              <a:rPr lang="it-IT" sz="1800" dirty="0" err="1">
-                <a:latin typeface="Tenorite (Corpo)"/>
-                <a:ea typeface="Cambria" panose="02040503050406030204" pitchFamily="18" charset="0"/>
-                <a:cs typeface="Cambria" panose="02040503050406030204" pitchFamily="18" charset="0"/>
-              </a:rPr>
-              <a:t>SoSignup</a:t>
-            </a:r>
-            <a:endParaRPr lang="it-IT" sz="1800" dirty="0">
-              <a:latin typeface="Tenorite (Corpo)"/>
-              <a:ea typeface="Cambria" panose="02040503050406030204" pitchFamily="18" charset="0"/>
-              <a:cs typeface="Cambria" panose="02040503050406030204" pitchFamily="18" charset="0"/>
-            </a:endParaRPr>
-          </a:p>
-          <a:p>
-            <a:pPr marR="73660" algn="just">
-              <a:lnSpc>
-                <a:spcPct val="115000"/>
-              </a:lnSpc>
-              <a:spcBef>
-                <a:spcPts val="225"/>
-              </a:spcBef>
-            </a:pPr>
-            <a:r>
-              <a:rPr lang="it-IT" sz="1800" dirty="0" err="1">
-                <a:latin typeface="Tenorite (Corpo)"/>
-                <a:ea typeface="Cambria" panose="02040503050406030204" pitchFamily="18" charset="0"/>
-                <a:cs typeface="Cambria" panose="02040503050406030204" pitchFamily="18" charset="0"/>
-              </a:rPr>
-              <a:t>GetAuctionDetails</a:t>
-            </a:r>
-            <a:endParaRPr lang="it-IT" sz="1800" dirty="0">
-              <a:latin typeface="Tenorite (Corpo)"/>
-              <a:ea typeface="Cambria" panose="02040503050406030204" pitchFamily="18" charset="0"/>
-              <a:cs typeface="Cambria" panose="02040503050406030204" pitchFamily="18" charset="0"/>
-            </a:endParaRPr>
-          </a:p>
-          <a:p>
-            <a:pPr marR="73660" algn="just">
-              <a:lnSpc>
-                <a:spcPct val="115000"/>
-              </a:lnSpc>
-              <a:spcBef>
-                <a:spcPts val="225"/>
-              </a:spcBef>
-            </a:pPr>
-            <a:r>
-              <a:rPr lang="it-IT" sz="1800" dirty="0" err="1">
-                <a:latin typeface="Tenorite (Corpo)"/>
-                <a:ea typeface="Cambria" panose="02040503050406030204" pitchFamily="18" charset="0"/>
-                <a:cs typeface="Cambria" panose="02040503050406030204" pitchFamily="18" charset="0"/>
-              </a:rPr>
-              <a:t>GetMatchingAuctions</a:t>
-            </a:r>
-            <a:endParaRPr lang="it-IT" sz="1800" dirty="0">
-              <a:latin typeface="Tenorite (Corpo)"/>
-              <a:ea typeface="Cambria" panose="02040503050406030204" pitchFamily="18" charset="0"/>
-              <a:cs typeface="Cambria" panose="02040503050406030204" pitchFamily="18" charset="0"/>
-            </a:endParaRPr>
-          </a:p>
-          <a:p>
-            <a:pPr marR="73660" algn="just">
-              <a:lnSpc>
-                <a:spcPct val="115000"/>
-              </a:lnSpc>
-              <a:spcBef>
-                <a:spcPts val="225"/>
-              </a:spcBef>
-            </a:pPr>
-            <a:r>
-              <a:rPr lang="it-IT" sz="1800" dirty="0" err="1">
-                <a:latin typeface="Tenorite (Corpo)"/>
-                <a:ea typeface="Cambria" panose="02040503050406030204" pitchFamily="18" charset="0"/>
-                <a:cs typeface="Cambria" panose="02040503050406030204" pitchFamily="18" charset="0"/>
-              </a:rPr>
-              <a:t>GetSearchedAuctions</a:t>
-            </a:r>
-            <a:endParaRPr lang="it-IT" sz="1800" dirty="0">
-              <a:latin typeface="Tenorite (Corpo)"/>
-              <a:ea typeface="Cambria" panose="02040503050406030204" pitchFamily="18" charset="0"/>
-              <a:cs typeface="Cambria" panose="02040503050406030204" pitchFamily="18" charset="0"/>
-            </a:endParaRPr>
-          </a:p>
-          <a:p>
-            <a:pPr marR="73660" algn="just">
-              <a:lnSpc>
-                <a:spcPct val="115000"/>
-              </a:lnSpc>
-              <a:spcBef>
-                <a:spcPts val="225"/>
-              </a:spcBef>
-            </a:pPr>
-            <a:r>
-              <a:rPr lang="it-IT" sz="1800" dirty="0" err="1">
-                <a:latin typeface="Tenorite (Corpo)"/>
-                <a:ea typeface="Cambria" panose="02040503050406030204" pitchFamily="18" charset="0"/>
-                <a:cs typeface="Cambria" panose="02040503050406030204" pitchFamily="18" charset="0"/>
-              </a:rPr>
-              <a:t>GetSell</a:t>
-            </a:r>
-            <a:endParaRPr lang="it-IT" sz="1800" dirty="0">
-              <a:latin typeface="Tenorite (Corpo)"/>
-              <a:ea typeface="Cambria" panose="02040503050406030204" pitchFamily="18" charset="0"/>
-              <a:cs typeface="Cambria" panose="02040503050406030204" pitchFamily="18" charset="0"/>
-            </a:endParaRPr>
-          </a:p>
-          <a:p>
-            <a:pPr marR="73660" algn="just">
-              <a:lnSpc>
-                <a:spcPct val="115000"/>
-              </a:lnSpc>
-              <a:spcBef>
-                <a:spcPts val="225"/>
-              </a:spcBef>
-            </a:pPr>
-            <a:r>
-              <a:rPr lang="it-IT" sz="1800" dirty="0" err="1">
-                <a:latin typeface="Tenorite (Corpo)"/>
-                <a:ea typeface="Cambria" panose="02040503050406030204" pitchFamily="18" charset="0"/>
-                <a:cs typeface="Cambria" panose="02040503050406030204" pitchFamily="18" charset="0"/>
-              </a:rPr>
-              <a:t>GetWonAuctions</a:t>
-            </a:r>
-            <a:endParaRPr lang="it-IT" sz="1800" dirty="0">
-              <a:latin typeface="Tenorite (Corpo)"/>
-              <a:ea typeface="Cambria" panose="02040503050406030204" pitchFamily="18" charset="0"/>
-              <a:cs typeface="Cambria" panose="02040503050406030204" pitchFamily="18" charset="0"/>
-            </a:endParaRPr>
-          </a:p>
-          <a:p>
-            <a:pPr marR="73660" algn="just">
-              <a:lnSpc>
-                <a:spcPct val="115000"/>
-              </a:lnSpc>
-              <a:spcBef>
-                <a:spcPts val="225"/>
-              </a:spcBef>
-            </a:pPr>
-            <a:r>
-              <a:rPr lang="it-IT" sz="1800" dirty="0" err="1">
-                <a:latin typeface="Tenorite (Corpo)"/>
-                <a:ea typeface="Cambria" panose="02040503050406030204" pitchFamily="18" charset="0"/>
-                <a:cs typeface="Cambria" panose="02040503050406030204" pitchFamily="18" charset="0"/>
-              </a:rPr>
-              <a:t>LoadDefaultPage</a:t>
-            </a:r>
-            <a:endParaRPr lang="it-IT" sz="1800" dirty="0">
-              <a:latin typeface="Tenorite (Corpo)"/>
-              <a:ea typeface="Cambria" panose="02040503050406030204" pitchFamily="18" charset="0"/>
-              <a:cs typeface="Cambria" panose="02040503050406030204" pitchFamily="18" charset="0"/>
-            </a:endParaRPr>
-          </a:p>
-        </p:txBody>
-      </p:sp>
+      </p:pic>
     </p:spTree>
     <p:extLst>
       <p:ext uri="{BB962C8B-B14F-4D97-AF65-F5344CB8AC3E}">
-        <p14:creationId xmlns:p14="http://schemas.microsoft.com/office/powerpoint/2010/main" val="640691602"/>
+        <p14:creationId xmlns:p14="http://schemas.microsoft.com/office/powerpoint/2010/main" val="351690905"/>
       </p:ext>
     </p:extLst>
   </p:cSld>
@@ -25468,10 +23293,10 @@
       </p:sp>
       <p:pic>
         <p:nvPicPr>
-          <p:cNvPr id="3" name="Immagine 2" descr="Immagine che contiene testo, linea, diagramma, schermata&#10;&#10;Descrizione generata automaticamente">
+          <p:cNvPr id="3" name="Immagine 2" descr="Immagine che contiene testo, schermata, schermo, numero&#10;&#10;Descrizione generata automaticamente">
             <a:extLst>
               <a:ext uri="{FF2B5EF4-FFF2-40B4-BE49-F238E27FC236}">
-                <a16:creationId xmlns:a16="http://schemas.microsoft.com/office/drawing/2014/main" id="{620E1218-F6F9-B4A2-4F7A-D596029A14AE}"/>
+                <a16:creationId xmlns:a16="http://schemas.microsoft.com/office/drawing/2014/main" id="{BBA52FFE-2C9A-92E0-E7C0-21C067055F2E}"/>
               </a:ext>
             </a:extLst>
           </p:cNvPr>
@@ -25488,8 +23313,8 @@
         </p:blipFill>
         <p:spPr>
           <a:xfrm>
-            <a:off x="1129004" y="1355055"/>
-            <a:ext cx="9933992" cy="4595233"/>
+            <a:off x="1789972" y="1155880"/>
+            <a:ext cx="8612055" cy="5206280"/>
           </a:xfrm>
           <a:prstGeom prst="rect">
             <a:avLst/>
@@ -25499,7 +23324,7 @@
     </p:spTree>
     <p:extLst>
       <p:ext uri="{BB962C8B-B14F-4D97-AF65-F5344CB8AC3E}">
-        <p14:creationId xmlns:p14="http://schemas.microsoft.com/office/powerpoint/2010/main" val="351690905"/>
+        <p14:creationId xmlns:p14="http://schemas.microsoft.com/office/powerpoint/2010/main" val="2901376926"/>
       </p:ext>
     </p:extLst>
   </p:cSld>
@@ -25816,10 +23641,10 @@
       </p:sp>
       <p:pic>
         <p:nvPicPr>
-          <p:cNvPr id="3" name="Immagine 2" descr="Immagine che contiene testo, schermata, schermo, numero&#10;&#10;Descrizione generata automaticamente">
+          <p:cNvPr id="3" name="Immagine 2" descr="Immagine che contiene testo, diagramma, Parallelo, numero&#10;&#10;Descrizione generata automaticamente">
             <a:extLst>
               <a:ext uri="{FF2B5EF4-FFF2-40B4-BE49-F238E27FC236}">
-                <a16:creationId xmlns:a16="http://schemas.microsoft.com/office/drawing/2014/main" id="{BBA52FFE-2C9A-92E0-E7C0-21C067055F2E}"/>
+                <a16:creationId xmlns:a16="http://schemas.microsoft.com/office/drawing/2014/main" id="{43F1A841-2655-908B-CD6C-1CB1AAB8B609}"/>
               </a:ext>
             </a:extLst>
           </p:cNvPr>
@@ -25836,8 +23661,8 @@
         </p:blipFill>
         <p:spPr>
           <a:xfrm>
-            <a:off x="1789972" y="1155880"/>
-            <a:ext cx="8612055" cy="5206280"/>
+            <a:off x="2491540" y="1218099"/>
+            <a:ext cx="7208919" cy="5100471"/>
           </a:xfrm>
           <a:prstGeom prst="rect">
             <a:avLst/>
@@ -25847,7 +23672,7 @@
     </p:spTree>
     <p:extLst>
       <p:ext uri="{BB962C8B-B14F-4D97-AF65-F5344CB8AC3E}">
-        <p14:creationId xmlns:p14="http://schemas.microsoft.com/office/powerpoint/2010/main" val="2901376926"/>
+        <p14:creationId xmlns:p14="http://schemas.microsoft.com/office/powerpoint/2010/main" val="1219658663"/>
       </p:ext>
     </p:extLst>
   </p:cSld>
@@ -25990,10 +23815,10 @@
       </p:sp>
       <p:pic>
         <p:nvPicPr>
-          <p:cNvPr id="3" name="Immagine 2" descr="Immagine che contiene testo, diagramma, Parallelo, numero&#10;&#10;Descrizione generata automaticamente">
+          <p:cNvPr id="3" name="Immagine 2" descr="Immagine che contiene testo, diagramma, schermata, Parallelo&#10;&#10;Descrizione generata automaticamente">
             <a:extLst>
               <a:ext uri="{FF2B5EF4-FFF2-40B4-BE49-F238E27FC236}">
-                <a16:creationId xmlns:a16="http://schemas.microsoft.com/office/drawing/2014/main" id="{43F1A841-2655-908B-CD6C-1CB1AAB8B609}"/>
+                <a16:creationId xmlns:a16="http://schemas.microsoft.com/office/drawing/2014/main" id="{2A726D2F-ED2F-A6DA-72E3-997252D8185F}"/>
               </a:ext>
             </a:extLst>
           </p:cNvPr>
@@ -26010,8 +23835,8 @@
         </p:blipFill>
         <p:spPr>
           <a:xfrm>
-            <a:off x="2491540" y="1218099"/>
-            <a:ext cx="7208919" cy="5100471"/>
+            <a:off x="2436649" y="1247490"/>
+            <a:ext cx="7584043" cy="5149658"/>
           </a:xfrm>
           <a:prstGeom prst="rect">
             <a:avLst/>
@@ -26021,7 +23846,7 @@
     </p:spTree>
     <p:extLst>
       <p:ext uri="{BB962C8B-B14F-4D97-AF65-F5344CB8AC3E}">
-        <p14:creationId xmlns:p14="http://schemas.microsoft.com/office/powerpoint/2010/main" val="1219658663"/>
+        <p14:creationId xmlns:p14="http://schemas.microsoft.com/office/powerpoint/2010/main" val="2218606816"/>
       </p:ext>
     </p:extLst>
   </p:cSld>
@@ -26164,10 +23989,10 @@
       </p:sp>
       <p:pic>
         <p:nvPicPr>
-          <p:cNvPr id="3" name="Immagine 2" descr="Immagine che contiene testo, diagramma, schermata, Parallelo&#10;&#10;Descrizione generata automaticamente">
+          <p:cNvPr id="3" name="Immagine 2" descr="Immagine che contiene testo, diagramma, linea, Parallelo&#10;&#10;Descrizione generata automaticamente">
             <a:extLst>
               <a:ext uri="{FF2B5EF4-FFF2-40B4-BE49-F238E27FC236}">
-                <a16:creationId xmlns:a16="http://schemas.microsoft.com/office/drawing/2014/main" id="{2A726D2F-ED2F-A6DA-72E3-997252D8185F}"/>
+                <a16:creationId xmlns:a16="http://schemas.microsoft.com/office/drawing/2014/main" id="{CC14366F-65BF-ACB8-D722-44BAF05D8612}"/>
               </a:ext>
             </a:extLst>
           </p:cNvPr>
@@ -26184,8 +24009,8 @@
         </p:blipFill>
         <p:spPr>
           <a:xfrm>
-            <a:off x="2436649" y="1247490"/>
-            <a:ext cx="7584043" cy="5149658"/>
+            <a:off x="1616454" y="1131132"/>
+            <a:ext cx="8959091" cy="5241715"/>
           </a:xfrm>
           <a:prstGeom prst="rect">
             <a:avLst/>
@@ -26195,7 +24020,7 @@
     </p:spTree>
     <p:extLst>
       <p:ext uri="{BB962C8B-B14F-4D97-AF65-F5344CB8AC3E}">
-        <p14:creationId xmlns:p14="http://schemas.microsoft.com/office/powerpoint/2010/main" val="2218606816"/>
+        <p14:creationId xmlns:p14="http://schemas.microsoft.com/office/powerpoint/2010/main" val="2610155575"/>
       </p:ext>
     </p:extLst>
   </p:cSld>
@@ -26338,10 +24163,10 @@
       </p:sp>
       <p:pic>
         <p:nvPicPr>
-          <p:cNvPr id="3" name="Immagine 2" descr="Immagine che contiene testo, diagramma, linea, Parallelo&#10;&#10;Descrizione generata automaticamente">
+          <p:cNvPr id="3" name="Immagine 2" descr="Immagine che contiene testo, diagramma, schermata, Parallelo&#10;&#10;Descrizione generata automaticamente">
             <a:extLst>
               <a:ext uri="{FF2B5EF4-FFF2-40B4-BE49-F238E27FC236}">
-                <a16:creationId xmlns:a16="http://schemas.microsoft.com/office/drawing/2014/main" id="{CC14366F-65BF-ACB8-D722-44BAF05D8612}"/>
+                <a16:creationId xmlns:a16="http://schemas.microsoft.com/office/drawing/2014/main" id="{B7557E78-C1B7-1C5E-AED5-11B752622955}"/>
               </a:ext>
             </a:extLst>
           </p:cNvPr>
@@ -26350,16 +24175,15 @@
           </p:cNvPicPr>
           <p:nvPr/>
         </p:nvPicPr>
-        <p:blipFill>
+        <p:blipFill rotWithShape="1">
           <a:blip r:embed="rId3"/>
-          <a:stretch>
-            <a:fillRect/>
-          </a:stretch>
+          <a:srcRect b="53127"/>
+          <a:stretch/>
         </p:blipFill>
         <p:spPr>
           <a:xfrm>
-            <a:off x="1616454" y="1131132"/>
-            <a:ext cx="8959091" cy="5241715"/>
+            <a:off x="2262651" y="1234910"/>
+            <a:ext cx="8059700" cy="5143306"/>
           </a:xfrm>
           <a:prstGeom prst="rect">
             <a:avLst/>
@@ -26369,7 +24193,7 @@
     </p:spTree>
     <p:extLst>
       <p:ext uri="{BB962C8B-B14F-4D97-AF65-F5344CB8AC3E}">
-        <p14:creationId xmlns:p14="http://schemas.microsoft.com/office/powerpoint/2010/main" val="2610155575"/>
+        <p14:creationId xmlns:p14="http://schemas.microsoft.com/office/powerpoint/2010/main" val="1060831614"/>
       </p:ext>
     </p:extLst>
   </p:cSld>
@@ -26515,7 +24339,7 @@
           <p:cNvPr id="3" name="Immagine 2" descr="Immagine che contiene testo, diagramma, schermata, Parallelo&#10;&#10;Descrizione generata automaticamente">
             <a:extLst>
               <a:ext uri="{FF2B5EF4-FFF2-40B4-BE49-F238E27FC236}">
-                <a16:creationId xmlns:a16="http://schemas.microsoft.com/office/drawing/2014/main" id="{B7557E78-C1B7-1C5E-AED5-11B752622955}"/>
+                <a16:creationId xmlns:a16="http://schemas.microsoft.com/office/drawing/2014/main" id="{041B2823-7D60-DA33-6360-282D2BE0C8CB}"/>
               </a:ext>
             </a:extLst>
           </p:cNvPr>
@@ -26524,15 +24348,16 @@
           </p:cNvPicPr>
           <p:nvPr/>
         </p:nvPicPr>
-        <p:blipFill rotWithShape="1">
+        <p:blipFill>
           <a:blip r:embed="rId3"/>
-          <a:srcRect b="53127"/>
-          <a:stretch/>
+          <a:stretch>
+            <a:fillRect/>
+          </a:stretch>
         </p:blipFill>
         <p:spPr>
           <a:xfrm>
-            <a:off x="2262651" y="1234910"/>
-            <a:ext cx="8059700" cy="5143306"/>
+            <a:off x="2209800" y="1214953"/>
+            <a:ext cx="8000475" cy="5141397"/>
           </a:xfrm>
           <a:prstGeom prst="rect">
             <a:avLst/>
@@ -26542,7 +24367,7 @@
     </p:spTree>
     <p:extLst>
       <p:ext uri="{BB962C8B-B14F-4D97-AF65-F5344CB8AC3E}">
-        <p14:creationId xmlns:p14="http://schemas.microsoft.com/office/powerpoint/2010/main" val="1060831614"/>
+        <p14:creationId xmlns:p14="http://schemas.microsoft.com/office/powerpoint/2010/main" val="1112512599"/>
       </p:ext>
     </p:extLst>
   </p:cSld>
@@ -26685,10 +24510,10 @@
       </p:sp>
       <p:pic>
         <p:nvPicPr>
-          <p:cNvPr id="3" name="Immagine 2" descr="Immagine che contiene testo, diagramma, schermata, Parallelo&#10;&#10;Descrizione generata automaticamente">
+          <p:cNvPr id="3" name="Immagine 2" descr="Immagine che contiene testo, Parallelo, diagramma, schermata&#10;&#10;Descrizione generata automaticamente">
             <a:extLst>
               <a:ext uri="{FF2B5EF4-FFF2-40B4-BE49-F238E27FC236}">
-                <a16:creationId xmlns:a16="http://schemas.microsoft.com/office/drawing/2014/main" id="{041B2823-7D60-DA33-6360-282D2BE0C8CB}"/>
+                <a16:creationId xmlns:a16="http://schemas.microsoft.com/office/drawing/2014/main" id="{80AECEC9-A241-280C-95DF-BB484904081A}"/>
               </a:ext>
             </a:extLst>
           </p:cNvPr>
@@ -26705,8 +24530,8 @@
         </p:blipFill>
         <p:spPr>
           <a:xfrm>
-            <a:off x="2209800" y="1214953"/>
-            <a:ext cx="8000475" cy="5141397"/>
+            <a:off x="1750953" y="1189038"/>
+            <a:ext cx="8690093" cy="5167312"/>
           </a:xfrm>
           <a:prstGeom prst="rect">
             <a:avLst/>
@@ -26716,7 +24541,7 @@
     </p:spTree>
     <p:extLst>
       <p:ext uri="{BB962C8B-B14F-4D97-AF65-F5344CB8AC3E}">
-        <p14:creationId xmlns:p14="http://schemas.microsoft.com/office/powerpoint/2010/main" val="1112512599"/>
+        <p14:creationId xmlns:p14="http://schemas.microsoft.com/office/powerpoint/2010/main" val="992271150"/>
       </p:ext>
     </p:extLst>
   </p:cSld>
@@ -26859,10 +24684,10 @@
       </p:sp>
       <p:pic>
         <p:nvPicPr>
-          <p:cNvPr id="3" name="Immagine 2" descr="Immagine che contiene testo, Parallelo, diagramma, schermata&#10;&#10;Descrizione generata automaticamente">
+          <p:cNvPr id="3" name="Immagine 2" descr="Immagine che contiene testo, linea, diagramma, numero&#10;&#10;Descrizione generata automaticamente">
             <a:extLst>
               <a:ext uri="{FF2B5EF4-FFF2-40B4-BE49-F238E27FC236}">
-                <a16:creationId xmlns:a16="http://schemas.microsoft.com/office/drawing/2014/main" id="{80AECEC9-A241-280C-95DF-BB484904081A}"/>
+                <a16:creationId xmlns:a16="http://schemas.microsoft.com/office/drawing/2014/main" id="{080D3536-6574-F1D8-92E9-2FFC6E13C604}"/>
               </a:ext>
             </a:extLst>
           </p:cNvPr>
@@ -26879,8 +24704,8 @@
         </p:blipFill>
         <p:spPr>
           <a:xfrm>
-            <a:off x="1750953" y="1189038"/>
-            <a:ext cx="8690093" cy="5167312"/>
+            <a:off x="838200" y="1229235"/>
+            <a:ext cx="10610748" cy="4944390"/>
           </a:xfrm>
           <a:prstGeom prst="rect">
             <a:avLst/>
@@ -26890,7 +24715,7 @@
     </p:spTree>
     <p:extLst>
       <p:ext uri="{BB962C8B-B14F-4D97-AF65-F5344CB8AC3E}">
-        <p14:creationId xmlns:p14="http://schemas.microsoft.com/office/powerpoint/2010/main" val="992271150"/>
+        <p14:creationId xmlns:p14="http://schemas.microsoft.com/office/powerpoint/2010/main" val="1639390325"/>
       </p:ext>
     </p:extLst>
   </p:cSld>
@@ -27033,10 +24858,10 @@
       </p:sp>
       <p:pic>
         <p:nvPicPr>
-          <p:cNvPr id="3" name="Immagine 2" descr="Immagine che contiene testo, linea, diagramma, numero&#10;&#10;Descrizione generata automaticamente">
+          <p:cNvPr id="3" name="Immagine 2" descr="Immagine che contiene testo, schermata, numero, Parallelo&#10;&#10;Descrizione generata automaticamente">
             <a:extLst>
               <a:ext uri="{FF2B5EF4-FFF2-40B4-BE49-F238E27FC236}">
-                <a16:creationId xmlns:a16="http://schemas.microsoft.com/office/drawing/2014/main" id="{080D3536-6574-F1D8-92E9-2FFC6E13C604}"/>
+                <a16:creationId xmlns:a16="http://schemas.microsoft.com/office/drawing/2014/main" id="{9DA97457-E67C-E194-3222-A0E96E4C1DA1}"/>
               </a:ext>
             </a:extLst>
           </p:cNvPr>
@@ -27053,8 +24878,8 @@
         </p:blipFill>
         <p:spPr>
           <a:xfrm>
-            <a:off x="838200" y="1229235"/>
-            <a:ext cx="10610748" cy="4944390"/>
+            <a:off x="1725796" y="1189038"/>
+            <a:ext cx="8740407" cy="5167312"/>
           </a:xfrm>
           <a:prstGeom prst="rect">
             <a:avLst/>
@@ -27064,7 +24889,7 @@
     </p:spTree>
     <p:extLst>
       <p:ext uri="{BB962C8B-B14F-4D97-AF65-F5344CB8AC3E}">
-        <p14:creationId xmlns:p14="http://schemas.microsoft.com/office/powerpoint/2010/main" val="1639390325"/>
+        <p14:creationId xmlns:p14="http://schemas.microsoft.com/office/powerpoint/2010/main" val="2766175043"/>
       </p:ext>
     </p:extLst>
   </p:cSld>
@@ -27207,10 +25032,10 @@
       </p:sp>
       <p:pic>
         <p:nvPicPr>
-          <p:cNvPr id="3" name="Immagine 2" descr="Immagine che contiene testo, schermata, numero, Parallelo&#10;&#10;Descrizione generata automaticamente">
+          <p:cNvPr id="3" name="Immagine 2" descr="Immagine che contiene testo, diagramma, linea, numero&#10;&#10;Descrizione generata automaticamente">
             <a:extLst>
               <a:ext uri="{FF2B5EF4-FFF2-40B4-BE49-F238E27FC236}">
-                <a16:creationId xmlns:a16="http://schemas.microsoft.com/office/drawing/2014/main" id="{9DA97457-E67C-E194-3222-A0E96E4C1DA1}"/>
+                <a16:creationId xmlns:a16="http://schemas.microsoft.com/office/drawing/2014/main" id="{761A4D2E-EBE0-6731-D02A-4A5C0546D2C3}"/>
               </a:ext>
             </a:extLst>
           </p:cNvPr>
@@ -27227,8 +25052,8 @@
         </p:blipFill>
         <p:spPr>
           <a:xfrm>
-            <a:off x="1725796" y="1189038"/>
-            <a:ext cx="8740407" cy="5167312"/>
+            <a:off x="1154783" y="1265995"/>
+            <a:ext cx="9882433" cy="4956452"/>
           </a:xfrm>
           <a:prstGeom prst="rect">
             <a:avLst/>
@@ -27238,7 +25063,7 @@
     </p:spTree>
     <p:extLst>
       <p:ext uri="{BB962C8B-B14F-4D97-AF65-F5344CB8AC3E}">
-        <p14:creationId xmlns:p14="http://schemas.microsoft.com/office/powerpoint/2010/main" val="2766175043"/>
+        <p14:creationId xmlns:p14="http://schemas.microsoft.com/office/powerpoint/2010/main" val="2733862772"/>
       </p:ext>
     </p:extLst>
   </p:cSld>
@@ -27381,10 +25206,10 @@
       </p:sp>
       <p:pic>
         <p:nvPicPr>
-          <p:cNvPr id="3" name="Immagine 2" descr="Immagine che contiene testo, diagramma, linea, numero&#10;&#10;Descrizione generata automaticamente">
+          <p:cNvPr id="3" name="Immagine 2" descr="Immagine che contiene testo, schermata, linea, Parallelo&#10;&#10;Descrizione generata automaticamente">
             <a:extLst>
               <a:ext uri="{FF2B5EF4-FFF2-40B4-BE49-F238E27FC236}">
-                <a16:creationId xmlns:a16="http://schemas.microsoft.com/office/drawing/2014/main" id="{761A4D2E-EBE0-6731-D02A-4A5C0546D2C3}"/>
+                <a16:creationId xmlns:a16="http://schemas.microsoft.com/office/drawing/2014/main" id="{5A2F3014-3034-E7AF-675C-8F3410E61EC7}"/>
               </a:ext>
             </a:extLst>
           </p:cNvPr>
@@ -27401,8 +25226,8 @@
         </p:blipFill>
         <p:spPr>
           <a:xfrm>
-            <a:off x="1154783" y="1265995"/>
-            <a:ext cx="9882433" cy="4956452"/>
+            <a:off x="688156" y="1212621"/>
+            <a:ext cx="10815687" cy="4992669"/>
           </a:xfrm>
           <a:prstGeom prst="rect">
             <a:avLst/>
@@ -27412,7 +25237,7 @@
     </p:spTree>
     <p:extLst>
       <p:ext uri="{BB962C8B-B14F-4D97-AF65-F5344CB8AC3E}">
-        <p14:creationId xmlns:p14="http://schemas.microsoft.com/office/powerpoint/2010/main" val="2733862772"/>
+        <p14:creationId xmlns:p14="http://schemas.microsoft.com/office/powerpoint/2010/main" val="552310975"/>
       </p:ext>
     </p:extLst>
   </p:cSld>
@@ -28426,180 +26251,6 @@
 </file>
 
 <file path=ppt/slides/slide40.xml><?xml version="1.0" encoding="utf-8"?>
-<p:sld xmlns:a="http://schemas.openxmlformats.org/drawingml/2006/main" xmlns:r="http://schemas.openxmlformats.org/officeDocument/2006/relationships" xmlns:p="http://schemas.openxmlformats.org/presentationml/2006/main">
-  <p:cSld>
-    <p:spTree>
-      <p:nvGrpSpPr>
-        <p:cNvPr id="1" name=""/>
-        <p:cNvGrpSpPr/>
-        <p:nvPr/>
-      </p:nvGrpSpPr>
-      <p:grpSpPr>
-        <a:xfrm>
-          <a:off x="0" y="0"/>
-          <a:ext cx="0" cy="0"/>
-          <a:chOff x="0" y="0"/>
-          <a:chExt cx="0" cy="0"/>
-        </a:xfrm>
-      </p:grpSpPr>
-      <p:sp>
-        <p:nvSpPr>
-          <p:cNvPr id="9" name="Segnaposto data 8">
-            <a:extLst>
-              <a:ext uri="{FF2B5EF4-FFF2-40B4-BE49-F238E27FC236}">
-                <a16:creationId xmlns:a16="http://schemas.microsoft.com/office/drawing/2014/main" id="{B86AD343-7149-4E7C-BD28-3080F25980CF}"/>
-              </a:ext>
-            </a:extLst>
-          </p:cNvPr>
-          <p:cNvSpPr>
-            <a:spLocks noGrp="1"/>
-          </p:cNvSpPr>
-          <p:nvPr>
-            <p:ph type="dt" sz="half" idx="10"/>
-          </p:nvPr>
-        </p:nvSpPr>
-        <p:spPr>
-          <a:xfrm>
-            <a:off x="838200" y="6356350"/>
-            <a:ext cx="2743200" cy="365125"/>
-          </a:xfrm>
-        </p:spPr>
-        <p:txBody>
-          <a:bodyPr rtlCol="0"/>
-          <a:lstStyle>
-            <a:defPPr>
-              <a:defRPr lang="it-IT"/>
-            </a:defPPr>
-          </a:lstStyle>
-          <a:p>
-            <a:pPr rtl="0"/>
-            <a:r>
-              <a:rPr lang="it-IT" dirty="0"/>
-              <a:t>2023</a:t>
-            </a:r>
-          </a:p>
-        </p:txBody>
-      </p:sp>
-      <p:sp>
-        <p:nvSpPr>
-          <p:cNvPr id="10" name="Segnaposto piè di pagina 9">
-            <a:extLst>
-              <a:ext uri="{FF2B5EF4-FFF2-40B4-BE49-F238E27FC236}">
-                <a16:creationId xmlns:a16="http://schemas.microsoft.com/office/drawing/2014/main" id="{A865CC01-A53B-495A-820C-BEC2680EDC42}"/>
-              </a:ext>
-            </a:extLst>
-          </p:cNvPr>
-          <p:cNvSpPr>
-            <a:spLocks noGrp="1"/>
-          </p:cNvSpPr>
-          <p:nvPr>
-            <p:ph type="ftr" sz="quarter" idx="11"/>
-          </p:nvPr>
-        </p:nvSpPr>
-        <p:spPr>
-          <a:xfrm>
-            <a:off x="4038600" y="6356350"/>
-            <a:ext cx="4114800" cy="365125"/>
-          </a:xfrm>
-        </p:spPr>
-        <p:txBody>
-          <a:bodyPr rtlCol="0"/>
-          <a:lstStyle>
-            <a:defPPr>
-              <a:defRPr lang="it-IT"/>
-            </a:defPPr>
-          </a:lstStyle>
-          <a:p>
-            <a:pPr rtl="0"/>
-            <a:r>
-              <a:rPr lang="it-IT" dirty="0"/>
-              <a:t>PROGETTO TIW</a:t>
-            </a:r>
-          </a:p>
-        </p:txBody>
-      </p:sp>
-      <p:sp>
-        <p:nvSpPr>
-          <p:cNvPr id="27" name="Titolo 2">
-            <a:extLst>
-              <a:ext uri="{FF2B5EF4-FFF2-40B4-BE49-F238E27FC236}">
-                <a16:creationId xmlns:a16="http://schemas.microsoft.com/office/drawing/2014/main" id="{F1F0C9E6-49D6-289D-F4E4-9CF59AAA211A}"/>
-              </a:ext>
-            </a:extLst>
-          </p:cNvPr>
-          <p:cNvSpPr>
-            <a:spLocks noGrp="1"/>
-          </p:cNvSpPr>
-          <p:nvPr>
-            <p:ph type="title"/>
-          </p:nvPr>
-        </p:nvSpPr>
-        <p:spPr>
-          <a:xfrm>
-            <a:off x="838200" y="365125"/>
-            <a:ext cx="10515600" cy="1325563"/>
-          </a:xfrm>
-        </p:spPr>
-        <p:txBody>
-          <a:bodyPr rtlCol="0"/>
-          <a:lstStyle>
-            <a:defPPr>
-              <a:defRPr lang="it-IT"/>
-            </a:defPPr>
-          </a:lstStyle>
-          <a:p>
-            <a:pPr rtl="0"/>
-            <a:r>
-              <a:rPr lang="it-IT" dirty="0"/>
-              <a:t>JAVASCRIPT</a:t>
-            </a:r>
-          </a:p>
-        </p:txBody>
-      </p:sp>
-      <p:pic>
-        <p:nvPicPr>
-          <p:cNvPr id="3" name="Immagine 2" descr="Immagine che contiene testo, schermata, linea, Parallelo&#10;&#10;Descrizione generata automaticamente">
-            <a:extLst>
-              <a:ext uri="{FF2B5EF4-FFF2-40B4-BE49-F238E27FC236}">
-                <a16:creationId xmlns:a16="http://schemas.microsoft.com/office/drawing/2014/main" id="{5A2F3014-3034-E7AF-675C-8F3410E61EC7}"/>
-              </a:ext>
-            </a:extLst>
-          </p:cNvPr>
-          <p:cNvPicPr>
-            <a:picLocks noChangeAspect="1"/>
-          </p:cNvPicPr>
-          <p:nvPr/>
-        </p:nvPicPr>
-        <p:blipFill>
-          <a:blip r:embed="rId3"/>
-          <a:stretch>
-            <a:fillRect/>
-          </a:stretch>
-        </p:blipFill>
-        <p:spPr>
-          <a:xfrm>
-            <a:off x="688156" y="1212621"/>
-            <a:ext cx="10815687" cy="4992669"/>
-          </a:xfrm>
-          <a:prstGeom prst="rect">
-            <a:avLst/>
-          </a:prstGeom>
-        </p:spPr>
-      </p:pic>
-    </p:spTree>
-    <p:extLst>
-      <p:ext uri="{BB962C8B-B14F-4D97-AF65-F5344CB8AC3E}">
-        <p14:creationId xmlns:p14="http://schemas.microsoft.com/office/powerpoint/2010/main" val="552310975"/>
-      </p:ext>
-    </p:extLst>
-  </p:cSld>
-  <p:clrMapOvr>
-    <a:masterClrMapping/>
-  </p:clrMapOvr>
-</p:sld>
-</file>
-
-<file path=ppt/slides/slide41.xml><?xml version="1.0" encoding="utf-8"?>
 <p:sld xmlns:a="http://schemas.openxmlformats.org/drawingml/2006/main" xmlns:r="http://schemas.openxmlformats.org/officeDocument/2006/relationships" xmlns:p="http://schemas.openxmlformats.org/presentationml/2006/main">
   <p:cSld>
     <p:spTree>
@@ -34918,7 +32569,7 @@
                 <a:ea typeface="Cambria" panose="02040503050406030204" pitchFamily="18" charset="0"/>
                 <a:cs typeface="Cambria" panose="02040503050406030204" pitchFamily="18" charset="0"/>
               </a:rPr>
-              <a:t>View</a:t>
+              <a:t>Viste</a:t>
             </a:r>
             <a:r>
               <a:rPr lang="it-IT" sz="1800" dirty="0">
@@ -34966,7 +32617,7 @@
                 <a:ea typeface="Cambria" panose="02040503050406030204" pitchFamily="18" charset="0"/>
                 <a:cs typeface="Cambria" panose="02040503050406030204" pitchFamily="18" charset="0"/>
               </a:rPr>
-              <a:t>view component</a:t>
+              <a:t>componenti delle viste</a:t>
             </a:r>
             <a:endParaRPr lang="it-IT" sz="1800" dirty="0">
               <a:effectLst/>
@@ -40033,7 +37684,7 @@
                 <a:ea typeface="Cambria" panose="02040503050406030204" pitchFamily="18" charset="0"/>
                 <a:cs typeface="Cambria" panose="02040503050406030204" pitchFamily="18" charset="0"/>
               </a:rPr>
-              <a:t>Event</a:t>
+              <a:t>Eventi</a:t>
             </a:r>
             <a:r>
               <a:rPr lang="it-IT" sz="1800" dirty="0">
@@ -40081,7 +37732,7 @@
                 <a:ea typeface="Cambria" panose="02040503050406030204" pitchFamily="18" charset="0"/>
                 <a:cs typeface="Cambria" panose="02040503050406030204" pitchFamily="18" charset="0"/>
               </a:rPr>
-              <a:t>Action</a:t>
+              <a:t>Azioni</a:t>
             </a:r>
             <a:endParaRPr lang="it-IT" sz="1800" dirty="0">
               <a:effectLst/>
@@ -40207,7 +37858,7 @@
         </p:spPr>
         <p:txBody>
           <a:bodyPr rtlCol="0">
-            <a:normAutofit lnSpcReduction="10000"/>
+            <a:normAutofit fontScale="92500" lnSpcReduction="20000"/>
           </a:bodyPr>
           <a:lstStyle>
             <a:defPPr>
@@ -40303,6 +37954,21 @@
               <a:rPr lang="it-IT" dirty="0"/>
               <a:t>Offerta: offerta in valore numerico intero</a:t>
             </a:r>
+          </a:p>
+          <a:p>
+            <a:pPr marL="285750" indent="-285750" rtl="0">
+              <a:buFont typeface="Arial" panose="020B0604020202020204" pitchFamily="34" charset="0"/>
+              <a:buChar char="•"/>
+            </a:pPr>
+            <a:r>
+              <a:rPr lang="it-IT" dirty="0"/>
+              <a:t>Quando un’asta viene chiusa i prodotti che contiene rimangono non vendibili sia se l’asta è stata vinta da qualcuno sia se l’asta non ha ricevuto </a:t>
+            </a:r>
+            <a:r>
+              <a:rPr lang="it-IT" dirty="0" err="1"/>
+              <a:t>offertew</a:t>
+            </a:r>
+            <a:endParaRPr lang="it-IT" dirty="0"/>
           </a:p>
           <a:p>
             <a:pPr rtl="0"/>
@@ -41671,11 +39337,18 @@
 <file path=customXml/itemProps1.xml><?xml version="1.0" encoding="utf-8"?>
 <ds:datastoreItem xmlns:ds="http://schemas.openxmlformats.org/officeDocument/2006/customXml" ds:itemID="{29C43685-694E-4579-B109-3C418D49DA65}">
   <ds:schemaRefs>
+    <ds:schemaRef ds:uri="http://purl.org/dc/dcmitype/"/>
+    <ds:schemaRef ds:uri="http://schemas.microsoft.com/office/2006/documentManagement/types"/>
+    <ds:schemaRef ds:uri="http://purl.org/dc/elements/1.1/"/>
+    <ds:schemaRef ds:uri="http://purl.org/dc/terms/"/>
+    <ds:schemaRef ds:uri="http://schemas.microsoft.com/sharepoint/v3"/>
     <ds:schemaRef ds:uri="http://schemas.microsoft.com/office/2006/metadata/properties"/>
+    <ds:schemaRef ds:uri="http://schemas.openxmlformats.org/package/2006/metadata/core-properties"/>
     <ds:schemaRef ds:uri="http://schemas.microsoft.com/office/infopath/2007/PartnerControls"/>
-    <ds:schemaRef ds:uri="http://schemas.microsoft.com/sharepoint/v3"/>
+    <ds:schemaRef ds:uri="http://www.w3.org/XML/1998/namespace"/>
+    <ds:schemaRef ds:uri="230e9df3-be65-4c73-a93b-d1236ebd677e"/>
+    <ds:schemaRef ds:uri="16c05727-aa75-4e4a-9b5f-8a80a1165891"/>
     <ds:schemaRef ds:uri="71af3243-3dd4-4a8d-8c0d-dd76da1f02a5"/>
-    <ds:schemaRef ds:uri="230e9df3-be65-4c73-a93b-d1236ebd677e"/>
   </ds:schemaRefs>
 </ds:datastoreItem>
 </file>

</xml_diff>